<commit_message>
Add animations to the powerpoint story
</commit_message>
<xml_diff>
--- a/Introduction to Dependency injection.pptx
+++ b/Introduction to Dependency injection.pptx
@@ -7,11 +7,12 @@
   <p:sldIdLst>
     <p:sldId id="257" r:id="rId2"/>
     <p:sldId id="258" r:id="rId3"/>
-    <p:sldId id="259" r:id="rId4"/>
-    <p:sldId id="260" r:id="rId5"/>
-    <p:sldId id="261" r:id="rId6"/>
-    <p:sldId id="262" r:id="rId7"/>
-    <p:sldId id="263" r:id="rId8"/>
+    <p:sldId id="265" r:id="rId4"/>
+    <p:sldId id="264" r:id="rId5"/>
+    <p:sldId id="260" r:id="rId6"/>
+    <p:sldId id="261" r:id="rId7"/>
+    <p:sldId id="262" r:id="rId8"/>
+    <p:sldId id="263" r:id="rId9"/>
   </p:sldIdLst>
   <p:sldSz cx="12192000" cy="6858000"/>
   <p:notesSz cx="6858000" cy="9144000"/>
@@ -110,6 +111,11 @@
       </a:defRPr>
     </a:lvl9pPr>
   </p:defaultTextStyle>
+  <p:extLst>
+    <p:ext uri="{EFAFB233-063F-42B5-8137-9DF3F51BA10A}">
+      <p15:sldGuideLst xmlns:p15="http://schemas.microsoft.com/office/powerpoint/2012/main"/>
+    </p:ext>
+  </p:extLst>
 </p:presentation>
 </file>
 
@@ -3662,16 +3668,1340 @@
           </a:p>
         </p:txBody>
       </p:sp>
+      <p:sp>
+        <p:nvSpPr>
+          <p:cNvPr id="3" name="Rectangle 2">
+            <a:extLst>
+              <a:ext uri="{FF2B5EF4-FFF2-40B4-BE49-F238E27FC236}">
+                <a16:creationId xmlns:a16="http://schemas.microsoft.com/office/drawing/2014/main" id="{FB28270C-9748-420C-B147-957F079C505E}"/>
+              </a:ext>
+            </a:extLst>
+          </p:cNvPr>
+          <p:cNvSpPr/>
+          <p:nvPr/>
+        </p:nvSpPr>
+        <p:spPr>
+          <a:xfrm>
+            <a:off x="3934436" y="1602297"/>
+            <a:ext cx="5184396" cy="2709644"/>
+          </a:xfrm>
+          <a:prstGeom prst="rect">
+            <a:avLst/>
+          </a:prstGeom>
+        </p:spPr>
+        <p:style>
+          <a:lnRef idx="2">
+            <a:schemeClr val="accent3">
+              <a:shade val="50000"/>
+            </a:schemeClr>
+          </a:lnRef>
+          <a:fillRef idx="1">
+            <a:schemeClr val="accent3"/>
+          </a:fillRef>
+          <a:effectRef idx="0">
+            <a:schemeClr val="accent3"/>
+          </a:effectRef>
+          <a:fontRef idx="minor">
+            <a:schemeClr val="lt1"/>
+          </a:fontRef>
+        </p:style>
+        <p:txBody>
+          <a:bodyPr rtlCol="0" anchor="ctr"/>
+          <a:lstStyle/>
+          <a:p>
+            <a:pPr algn="ctr"/>
+            <a:endParaRPr lang="nl-BE"/>
+          </a:p>
+        </p:txBody>
+      </p:sp>
+      <p:sp>
+        <p:nvSpPr>
+          <p:cNvPr id="4" name="TextBox 3">
+            <a:extLst>
+              <a:ext uri="{FF2B5EF4-FFF2-40B4-BE49-F238E27FC236}">
+                <a16:creationId xmlns:a16="http://schemas.microsoft.com/office/drawing/2014/main" id="{5F95816C-FDAC-4DB3-9F0C-823698C82BAA}"/>
+              </a:ext>
+            </a:extLst>
+          </p:cNvPr>
+          <p:cNvSpPr txBox="1"/>
+          <p:nvPr/>
+        </p:nvSpPr>
+        <p:spPr>
+          <a:xfrm>
+            <a:off x="5603845" y="1660912"/>
+            <a:ext cx="2248250" cy="369332"/>
+          </a:xfrm>
+          <a:prstGeom prst="rect">
+            <a:avLst/>
+          </a:prstGeom>
+          <a:noFill/>
+        </p:spPr>
+        <p:txBody>
+          <a:bodyPr wrap="square" rtlCol="0">
+            <a:spAutoFit/>
+          </a:bodyPr>
+          <a:lstStyle/>
+          <a:p>
+            <a:r>
+              <a:rPr lang="en-US" dirty="0"/>
+              <a:t>Construction yard</a:t>
+            </a:r>
+            <a:endParaRPr lang="nl-BE" dirty="0"/>
+          </a:p>
+        </p:txBody>
+      </p:sp>
+      <p:sp>
+        <p:nvSpPr>
+          <p:cNvPr id="5" name="Smiley Face 4">
+            <a:extLst>
+              <a:ext uri="{FF2B5EF4-FFF2-40B4-BE49-F238E27FC236}">
+                <a16:creationId xmlns:a16="http://schemas.microsoft.com/office/drawing/2014/main" id="{9B6DE02C-6B3A-434B-AD78-2ABAB091929F}"/>
+              </a:ext>
+            </a:extLst>
+          </p:cNvPr>
+          <p:cNvSpPr/>
+          <p:nvPr/>
+        </p:nvSpPr>
+        <p:spPr>
+          <a:xfrm>
+            <a:off x="3506600" y="2030244"/>
+            <a:ext cx="360726" cy="377505"/>
+          </a:xfrm>
+          <a:prstGeom prst="smileyFace">
+            <a:avLst>
+              <a:gd name="adj" fmla="val 4653"/>
+            </a:avLst>
+          </a:prstGeom>
+          <a:solidFill>
+            <a:schemeClr val="bg1"/>
+          </a:solidFill>
+          <a:ln>
+            <a:solidFill>
+              <a:schemeClr val="tx1"/>
+            </a:solidFill>
+          </a:ln>
+        </p:spPr>
+        <p:style>
+          <a:lnRef idx="2">
+            <a:schemeClr val="accent1">
+              <a:shade val="50000"/>
+            </a:schemeClr>
+          </a:lnRef>
+          <a:fillRef idx="1">
+            <a:schemeClr val="accent1"/>
+          </a:fillRef>
+          <a:effectRef idx="0">
+            <a:schemeClr val="accent1"/>
+          </a:effectRef>
+          <a:fontRef idx="minor">
+            <a:schemeClr val="lt1"/>
+          </a:fontRef>
+        </p:style>
+        <p:txBody>
+          <a:bodyPr rtlCol="0" anchor="ctr"/>
+          <a:lstStyle/>
+          <a:p>
+            <a:pPr algn="ctr"/>
+            <a:endParaRPr lang="nl-BE"/>
+          </a:p>
+        </p:txBody>
+      </p:sp>
+      <p:sp>
+        <p:nvSpPr>
+          <p:cNvPr id="7" name="Smiley Face 6">
+            <a:extLst>
+              <a:ext uri="{FF2B5EF4-FFF2-40B4-BE49-F238E27FC236}">
+                <a16:creationId xmlns:a16="http://schemas.microsoft.com/office/drawing/2014/main" id="{487F29D2-7F6E-4EAA-9DFC-53B7D4850756}"/>
+              </a:ext>
+            </a:extLst>
+          </p:cNvPr>
+          <p:cNvSpPr/>
+          <p:nvPr/>
+        </p:nvSpPr>
+        <p:spPr>
+          <a:xfrm>
+            <a:off x="704677" y="2030243"/>
+            <a:ext cx="360726" cy="377505"/>
+          </a:xfrm>
+          <a:prstGeom prst="smileyFace">
+            <a:avLst>
+              <a:gd name="adj" fmla="val 4653"/>
+            </a:avLst>
+          </a:prstGeom>
+          <a:solidFill>
+            <a:schemeClr val="bg1">
+              <a:lumMod val="85000"/>
+            </a:schemeClr>
+          </a:solidFill>
+          <a:ln>
+            <a:solidFill>
+              <a:schemeClr val="tx1"/>
+            </a:solidFill>
+          </a:ln>
+        </p:spPr>
+        <p:style>
+          <a:lnRef idx="2">
+            <a:schemeClr val="accent1">
+              <a:shade val="50000"/>
+            </a:schemeClr>
+          </a:lnRef>
+          <a:fillRef idx="1">
+            <a:schemeClr val="accent1"/>
+          </a:fillRef>
+          <a:effectRef idx="0">
+            <a:schemeClr val="accent1"/>
+          </a:effectRef>
+          <a:fontRef idx="minor">
+            <a:schemeClr val="lt1"/>
+          </a:fontRef>
+        </p:style>
+        <p:txBody>
+          <a:bodyPr rtlCol="0" anchor="ctr"/>
+          <a:lstStyle/>
+          <a:p>
+            <a:pPr algn="ctr"/>
+            <a:endParaRPr lang="nl-BE"/>
+          </a:p>
+        </p:txBody>
+      </p:sp>
+      <p:sp>
+        <p:nvSpPr>
+          <p:cNvPr id="8" name="Smiley Face 7">
+            <a:extLst>
+              <a:ext uri="{FF2B5EF4-FFF2-40B4-BE49-F238E27FC236}">
+                <a16:creationId xmlns:a16="http://schemas.microsoft.com/office/drawing/2014/main" id="{AD56CAEB-F057-4E7F-9E69-5FF8BB98861C}"/>
+              </a:ext>
+            </a:extLst>
+          </p:cNvPr>
+          <p:cNvSpPr/>
+          <p:nvPr/>
+        </p:nvSpPr>
+        <p:spPr>
+          <a:xfrm>
+            <a:off x="998292" y="3429000"/>
+            <a:ext cx="360726" cy="377505"/>
+          </a:xfrm>
+          <a:prstGeom prst="smileyFace">
+            <a:avLst>
+              <a:gd name="adj" fmla="val 4653"/>
+            </a:avLst>
+          </a:prstGeom>
+          <a:solidFill>
+            <a:srgbClr val="CC99FF"/>
+          </a:solidFill>
+          <a:ln>
+            <a:solidFill>
+              <a:schemeClr val="tx1"/>
+            </a:solidFill>
+          </a:ln>
+        </p:spPr>
+        <p:style>
+          <a:lnRef idx="2">
+            <a:schemeClr val="accent1">
+              <a:shade val="50000"/>
+            </a:schemeClr>
+          </a:lnRef>
+          <a:fillRef idx="1">
+            <a:schemeClr val="accent1"/>
+          </a:fillRef>
+          <a:effectRef idx="0">
+            <a:schemeClr val="accent1"/>
+          </a:effectRef>
+          <a:fontRef idx="minor">
+            <a:schemeClr val="lt1"/>
+          </a:fontRef>
+        </p:style>
+        <p:txBody>
+          <a:bodyPr rtlCol="0" anchor="ctr"/>
+          <a:lstStyle/>
+          <a:p>
+            <a:pPr algn="ctr"/>
+            <a:endParaRPr lang="nl-BE"/>
+          </a:p>
+        </p:txBody>
+      </p:sp>
+      <p:sp>
+        <p:nvSpPr>
+          <p:cNvPr id="9" name="Smiley Face 8">
+            <a:extLst>
+              <a:ext uri="{FF2B5EF4-FFF2-40B4-BE49-F238E27FC236}">
+                <a16:creationId xmlns:a16="http://schemas.microsoft.com/office/drawing/2014/main" id="{1E5E5087-3247-4942-B2C4-58363806702B}"/>
+              </a:ext>
+            </a:extLst>
+          </p:cNvPr>
+          <p:cNvSpPr/>
+          <p:nvPr/>
+        </p:nvSpPr>
+        <p:spPr>
+          <a:xfrm>
+            <a:off x="5100508" y="2548154"/>
+            <a:ext cx="360726" cy="377505"/>
+          </a:xfrm>
+          <a:prstGeom prst="smileyFace">
+            <a:avLst>
+              <a:gd name="adj" fmla="val 4653"/>
+            </a:avLst>
+          </a:prstGeom>
+          <a:solidFill>
+            <a:schemeClr val="bg1">
+              <a:lumMod val="85000"/>
+            </a:schemeClr>
+          </a:solidFill>
+          <a:ln>
+            <a:solidFill>
+              <a:schemeClr val="tx1"/>
+            </a:solidFill>
+          </a:ln>
+        </p:spPr>
+        <p:style>
+          <a:lnRef idx="2">
+            <a:schemeClr val="accent1">
+              <a:shade val="50000"/>
+            </a:schemeClr>
+          </a:lnRef>
+          <a:fillRef idx="1">
+            <a:schemeClr val="accent1"/>
+          </a:fillRef>
+          <a:effectRef idx="0">
+            <a:schemeClr val="accent1"/>
+          </a:effectRef>
+          <a:fontRef idx="minor">
+            <a:schemeClr val="lt1"/>
+          </a:fontRef>
+        </p:style>
+        <p:txBody>
+          <a:bodyPr rtlCol="0" anchor="ctr"/>
+          <a:lstStyle/>
+          <a:p>
+            <a:pPr algn="ctr"/>
+            <a:endParaRPr lang="nl-BE"/>
+          </a:p>
+        </p:txBody>
+      </p:sp>
+      <p:sp>
+        <p:nvSpPr>
+          <p:cNvPr id="14" name="Speech Bubble: Rectangle 13">
+            <a:extLst>
+              <a:ext uri="{FF2B5EF4-FFF2-40B4-BE49-F238E27FC236}">
+                <a16:creationId xmlns:a16="http://schemas.microsoft.com/office/drawing/2014/main" id="{8C1D01B8-17BB-406C-B974-235CA6654C6B}"/>
+              </a:ext>
+            </a:extLst>
+          </p:cNvPr>
+          <p:cNvSpPr/>
+          <p:nvPr/>
+        </p:nvSpPr>
+        <p:spPr>
+          <a:xfrm>
+            <a:off x="3219275" y="1084293"/>
+            <a:ext cx="1430321" cy="693140"/>
+          </a:xfrm>
+          <a:prstGeom prst="wedgeRectCallout">
+            <a:avLst/>
+          </a:prstGeom>
+          <a:solidFill>
+            <a:schemeClr val="bg1"/>
+          </a:solidFill>
+        </p:spPr>
+        <p:style>
+          <a:lnRef idx="2">
+            <a:schemeClr val="accent1">
+              <a:shade val="50000"/>
+            </a:schemeClr>
+          </a:lnRef>
+          <a:fillRef idx="1">
+            <a:schemeClr val="accent1"/>
+          </a:fillRef>
+          <a:effectRef idx="0">
+            <a:schemeClr val="accent1"/>
+          </a:effectRef>
+          <a:fontRef idx="minor">
+            <a:schemeClr val="lt1"/>
+          </a:fontRef>
+        </p:style>
+        <p:txBody>
+          <a:bodyPr rtlCol="0" anchor="ctr"/>
+          <a:lstStyle/>
+          <a:p>
+            <a:pPr algn="ctr"/>
+            <a:r>
+              <a:rPr lang="en-US" dirty="0">
+                <a:solidFill>
+                  <a:schemeClr val="tx1"/>
+                </a:solidFill>
+              </a:rPr>
+              <a:t>I need a new worker</a:t>
+            </a:r>
+            <a:endParaRPr lang="nl-BE" dirty="0">
+              <a:solidFill>
+                <a:schemeClr val="tx1"/>
+              </a:solidFill>
+            </a:endParaRPr>
+          </a:p>
+        </p:txBody>
+      </p:sp>
+      <p:sp>
+        <p:nvSpPr>
+          <p:cNvPr id="15" name="Speech Bubble: Rectangle 14">
+            <a:extLst>
+              <a:ext uri="{FF2B5EF4-FFF2-40B4-BE49-F238E27FC236}">
+                <a16:creationId xmlns:a16="http://schemas.microsoft.com/office/drawing/2014/main" id="{7B9C1EDE-8A8F-4778-A91F-652B3E39FCCC}"/>
+              </a:ext>
+            </a:extLst>
+          </p:cNvPr>
+          <p:cNvSpPr/>
+          <p:nvPr/>
+        </p:nvSpPr>
+        <p:spPr>
+          <a:xfrm>
+            <a:off x="3219275" y="1126046"/>
+            <a:ext cx="1652631" cy="693140"/>
+          </a:xfrm>
+          <a:prstGeom prst="wedgeRectCallout">
+            <a:avLst/>
+          </a:prstGeom>
+          <a:solidFill>
+            <a:schemeClr val="bg1"/>
+          </a:solidFill>
+        </p:spPr>
+        <p:style>
+          <a:lnRef idx="2">
+            <a:schemeClr val="accent1">
+              <a:shade val="50000"/>
+            </a:schemeClr>
+          </a:lnRef>
+          <a:fillRef idx="1">
+            <a:schemeClr val="accent1"/>
+          </a:fillRef>
+          <a:effectRef idx="0">
+            <a:schemeClr val="accent1"/>
+          </a:effectRef>
+          <a:fontRef idx="minor">
+            <a:schemeClr val="lt1"/>
+          </a:fontRef>
+        </p:style>
+        <p:txBody>
+          <a:bodyPr rtlCol="0" anchor="ctr"/>
+          <a:lstStyle/>
+          <a:p>
+            <a:pPr algn="ctr"/>
+            <a:r>
+              <a:rPr lang="en-US" dirty="0">
+                <a:solidFill>
+                  <a:schemeClr val="tx1"/>
+                </a:solidFill>
+              </a:rPr>
+              <a:t>I need another worker</a:t>
+            </a:r>
+            <a:endParaRPr lang="nl-BE" dirty="0">
+              <a:solidFill>
+                <a:schemeClr val="tx1"/>
+              </a:solidFill>
+            </a:endParaRPr>
+          </a:p>
+        </p:txBody>
+      </p:sp>
+      <p:sp>
+        <p:nvSpPr>
+          <p:cNvPr id="16" name="Speech Bubble: Rectangle 15">
+            <a:extLst>
+              <a:ext uri="{FF2B5EF4-FFF2-40B4-BE49-F238E27FC236}">
+                <a16:creationId xmlns:a16="http://schemas.microsoft.com/office/drawing/2014/main" id="{B7EE4373-89BB-43EA-ADDD-4ACC5D40438B}"/>
+              </a:ext>
+            </a:extLst>
+          </p:cNvPr>
+          <p:cNvSpPr/>
+          <p:nvPr/>
+        </p:nvSpPr>
+        <p:spPr>
+          <a:xfrm>
+            <a:off x="286447" y="1151992"/>
+            <a:ext cx="2114024" cy="693140"/>
+          </a:xfrm>
+          <a:prstGeom prst="wedgeRectCallout">
+            <a:avLst/>
+          </a:prstGeom>
+          <a:solidFill>
+            <a:schemeClr val="bg1"/>
+          </a:solidFill>
+        </p:spPr>
+        <p:style>
+          <a:lnRef idx="2">
+            <a:schemeClr val="accent1">
+              <a:shade val="50000"/>
+            </a:schemeClr>
+          </a:lnRef>
+          <a:fillRef idx="1">
+            <a:schemeClr val="accent1"/>
+          </a:fillRef>
+          <a:effectRef idx="0">
+            <a:schemeClr val="accent1"/>
+          </a:effectRef>
+          <a:fontRef idx="minor">
+            <a:schemeClr val="lt1"/>
+          </a:fontRef>
+        </p:style>
+        <p:txBody>
+          <a:bodyPr rtlCol="0" anchor="ctr"/>
+          <a:lstStyle/>
+          <a:p>
+            <a:pPr algn="ctr"/>
+            <a:r>
+              <a:rPr lang="en-US" dirty="0">
+                <a:solidFill>
+                  <a:schemeClr val="tx1"/>
+                </a:solidFill>
+              </a:rPr>
+              <a:t>Sup boss, brought my own tools</a:t>
+            </a:r>
+            <a:endParaRPr lang="nl-BE" dirty="0">
+              <a:solidFill>
+                <a:schemeClr val="tx1"/>
+              </a:solidFill>
+            </a:endParaRPr>
+          </a:p>
+        </p:txBody>
+      </p:sp>
+      <p:sp>
+        <p:nvSpPr>
+          <p:cNvPr id="17" name="Speech Bubble: Rectangle 16">
+            <a:extLst>
+              <a:ext uri="{FF2B5EF4-FFF2-40B4-BE49-F238E27FC236}">
+                <a16:creationId xmlns:a16="http://schemas.microsoft.com/office/drawing/2014/main" id="{A4524628-C6E9-4945-9025-62291C68407E}"/>
+              </a:ext>
+            </a:extLst>
+          </p:cNvPr>
+          <p:cNvSpPr/>
+          <p:nvPr/>
+        </p:nvSpPr>
+        <p:spPr>
+          <a:xfrm>
+            <a:off x="713067" y="2592859"/>
+            <a:ext cx="1652631" cy="693140"/>
+          </a:xfrm>
+          <a:prstGeom prst="wedgeRectCallout">
+            <a:avLst/>
+          </a:prstGeom>
+          <a:solidFill>
+            <a:schemeClr val="bg1"/>
+          </a:solidFill>
+        </p:spPr>
+        <p:style>
+          <a:lnRef idx="2">
+            <a:schemeClr val="accent1">
+              <a:shade val="50000"/>
+            </a:schemeClr>
+          </a:lnRef>
+          <a:fillRef idx="1">
+            <a:schemeClr val="accent1"/>
+          </a:fillRef>
+          <a:effectRef idx="0">
+            <a:schemeClr val="accent1"/>
+          </a:effectRef>
+          <a:fontRef idx="minor">
+            <a:schemeClr val="lt1"/>
+          </a:fontRef>
+        </p:style>
+        <p:txBody>
+          <a:bodyPr rtlCol="0" anchor="ctr"/>
+          <a:lstStyle/>
+          <a:p>
+            <a:pPr algn="ctr"/>
+            <a:r>
+              <a:rPr lang="en-US" dirty="0">
+                <a:solidFill>
+                  <a:schemeClr val="tx1"/>
+                </a:solidFill>
+              </a:rPr>
+              <a:t>Ready to work</a:t>
+            </a:r>
+            <a:endParaRPr lang="nl-BE" dirty="0">
+              <a:solidFill>
+                <a:schemeClr val="tx1"/>
+              </a:solidFill>
+            </a:endParaRPr>
+          </a:p>
+        </p:txBody>
+      </p:sp>
+      <p:sp>
+        <p:nvSpPr>
+          <p:cNvPr id="18" name="Smiley Face 17">
+            <a:extLst>
+              <a:ext uri="{FF2B5EF4-FFF2-40B4-BE49-F238E27FC236}">
+                <a16:creationId xmlns:a16="http://schemas.microsoft.com/office/drawing/2014/main" id="{07E55897-D22C-4124-B72B-F4E833CB6A36}"/>
+              </a:ext>
+            </a:extLst>
+          </p:cNvPr>
+          <p:cNvSpPr/>
+          <p:nvPr/>
+        </p:nvSpPr>
+        <p:spPr>
+          <a:xfrm>
+            <a:off x="6346271" y="3504501"/>
+            <a:ext cx="360726" cy="377505"/>
+          </a:xfrm>
+          <a:prstGeom prst="smileyFace">
+            <a:avLst>
+              <a:gd name="adj" fmla="val 4653"/>
+            </a:avLst>
+          </a:prstGeom>
+          <a:solidFill>
+            <a:srgbClr val="CC99FF"/>
+          </a:solidFill>
+          <a:ln>
+            <a:solidFill>
+              <a:schemeClr val="tx1"/>
+            </a:solidFill>
+          </a:ln>
+        </p:spPr>
+        <p:style>
+          <a:lnRef idx="2">
+            <a:schemeClr val="accent1">
+              <a:shade val="50000"/>
+            </a:schemeClr>
+          </a:lnRef>
+          <a:fillRef idx="1">
+            <a:schemeClr val="accent1"/>
+          </a:fillRef>
+          <a:effectRef idx="0">
+            <a:schemeClr val="accent1"/>
+          </a:effectRef>
+          <a:fontRef idx="minor">
+            <a:schemeClr val="lt1"/>
+          </a:fontRef>
+        </p:style>
+        <p:txBody>
+          <a:bodyPr rtlCol="0" anchor="ctr"/>
+          <a:lstStyle/>
+          <a:p>
+            <a:pPr algn="ctr"/>
+            <a:endParaRPr lang="nl-BE"/>
+          </a:p>
+        </p:txBody>
+      </p:sp>
+      <p:cxnSp>
+        <p:nvCxnSpPr>
+          <p:cNvPr id="20" name="Straight Connector 19">
+            <a:extLst>
+              <a:ext uri="{FF2B5EF4-FFF2-40B4-BE49-F238E27FC236}">
+                <a16:creationId xmlns:a16="http://schemas.microsoft.com/office/drawing/2014/main" id="{EA3FD00A-E989-4416-884A-F2D2BABC3FC9}"/>
+              </a:ext>
+            </a:extLst>
+          </p:cNvPr>
+          <p:cNvCxnSpPr/>
+          <p:nvPr/>
+        </p:nvCxnSpPr>
+        <p:spPr>
+          <a:xfrm flipH="1" flipV="1">
+            <a:off x="3447875" y="2407748"/>
+            <a:ext cx="486560" cy="360618"/>
+          </a:xfrm>
+          <a:prstGeom prst="line">
+            <a:avLst/>
+          </a:prstGeom>
+        </p:spPr>
+        <p:style>
+          <a:lnRef idx="1">
+            <a:schemeClr val="accent1"/>
+          </a:lnRef>
+          <a:fillRef idx="0">
+            <a:schemeClr val="accent1"/>
+          </a:fillRef>
+          <a:effectRef idx="0">
+            <a:schemeClr val="accent1"/>
+          </a:effectRef>
+          <a:fontRef idx="minor">
+            <a:schemeClr val="tx1"/>
+          </a:fontRef>
+        </p:style>
+      </p:cxnSp>
+      <p:sp>
+        <p:nvSpPr>
+          <p:cNvPr id="21" name="Smiley Face 20">
+            <a:extLst>
+              <a:ext uri="{FF2B5EF4-FFF2-40B4-BE49-F238E27FC236}">
+                <a16:creationId xmlns:a16="http://schemas.microsoft.com/office/drawing/2014/main" id="{33A49058-5B2B-4DD1-9BC0-7502A0405B52}"/>
+              </a:ext>
+            </a:extLst>
+          </p:cNvPr>
+          <p:cNvSpPr/>
+          <p:nvPr/>
+        </p:nvSpPr>
+        <p:spPr>
+          <a:xfrm>
+            <a:off x="3506599" y="2030568"/>
+            <a:ext cx="360726" cy="377505"/>
+          </a:xfrm>
+          <a:prstGeom prst="smileyFace">
+            <a:avLst>
+              <a:gd name="adj" fmla="val -4653"/>
+            </a:avLst>
+          </a:prstGeom>
+          <a:solidFill>
+            <a:srgbClr val="FF0000"/>
+          </a:solidFill>
+          <a:ln>
+            <a:solidFill>
+              <a:schemeClr val="tx1"/>
+            </a:solidFill>
+          </a:ln>
+        </p:spPr>
+        <p:style>
+          <a:lnRef idx="2">
+            <a:schemeClr val="accent1">
+              <a:shade val="50000"/>
+            </a:schemeClr>
+          </a:lnRef>
+          <a:fillRef idx="1">
+            <a:schemeClr val="accent1"/>
+          </a:fillRef>
+          <a:effectRef idx="0">
+            <a:schemeClr val="accent1"/>
+          </a:effectRef>
+          <a:fontRef idx="minor">
+            <a:schemeClr val="lt1"/>
+          </a:fontRef>
+        </p:style>
+        <p:txBody>
+          <a:bodyPr rtlCol="0" anchor="ctr"/>
+          <a:lstStyle/>
+          <a:p>
+            <a:pPr algn="ctr"/>
+            <a:endParaRPr lang="nl-BE"/>
+          </a:p>
+        </p:txBody>
+      </p:sp>
     </p:spTree>
     <p:extLst>
       <p:ext uri="{BB962C8B-B14F-4D97-AF65-F5344CB8AC3E}">
-        <p14:creationId xmlns:p14="http://schemas.microsoft.com/office/powerpoint/2010/main" val="2353099742"/>
+        <p14:creationId xmlns:p14="http://schemas.microsoft.com/office/powerpoint/2010/main" val="2221210244"/>
       </p:ext>
     </p:extLst>
   </p:cSld>
   <p:clrMapOvr>
     <a:masterClrMapping/>
   </p:clrMapOvr>
+  <p:timing>
+    <p:tnLst>
+      <p:par>
+        <p:cTn id="1" dur="indefinite" restart="never" nodeType="tmRoot">
+          <p:childTnLst>
+            <p:seq concurrent="1" nextAc="seek">
+              <p:cTn id="2" dur="indefinite" nodeType="mainSeq">
+                <p:childTnLst>
+                  <p:par>
+                    <p:cTn id="3" fill="hold">
+                      <p:stCondLst>
+                        <p:cond delay="indefinite"/>
+                      </p:stCondLst>
+                      <p:childTnLst>
+                        <p:par>
+                          <p:cTn id="4" fill="hold">
+                            <p:stCondLst>
+                              <p:cond delay="0"/>
+                            </p:stCondLst>
+                            <p:childTnLst>
+                              <p:par>
+                                <p:cTn id="5" presetID="1" presetClass="entr" presetSubtype="0" fill="hold" grpId="0" nodeType="clickEffect">
+                                  <p:stCondLst>
+                                    <p:cond delay="0"/>
+                                  </p:stCondLst>
+                                  <p:childTnLst>
+                                    <p:set>
+                                      <p:cBhvr>
+                                        <p:cTn id="6" dur="1" fill="hold">
+                                          <p:stCondLst>
+                                            <p:cond delay="0"/>
+                                          </p:stCondLst>
+                                        </p:cTn>
+                                        <p:tgtEl>
+                                          <p:spTgt spid="14"/>
+                                        </p:tgtEl>
+                                        <p:attrNameLst>
+                                          <p:attrName>style.visibility</p:attrName>
+                                        </p:attrNameLst>
+                                      </p:cBhvr>
+                                      <p:to>
+                                        <p:strVal val="visible"/>
+                                      </p:to>
+                                    </p:set>
+                                  </p:childTnLst>
+                                </p:cTn>
+                              </p:par>
+                            </p:childTnLst>
+                          </p:cTn>
+                        </p:par>
+                      </p:childTnLst>
+                    </p:cTn>
+                  </p:par>
+                  <p:par>
+                    <p:cTn id="7" fill="hold">
+                      <p:stCondLst>
+                        <p:cond delay="indefinite"/>
+                      </p:stCondLst>
+                      <p:childTnLst>
+                        <p:par>
+                          <p:cTn id="8" fill="hold">
+                            <p:stCondLst>
+                              <p:cond delay="0"/>
+                            </p:stCondLst>
+                            <p:childTnLst>
+                              <p:par>
+                                <p:cTn id="9" presetID="1" presetClass="exit" presetSubtype="0" fill="hold" grpId="1" nodeType="clickEffect">
+                                  <p:stCondLst>
+                                    <p:cond delay="0"/>
+                                  </p:stCondLst>
+                                  <p:childTnLst>
+                                    <p:set>
+                                      <p:cBhvr>
+                                        <p:cTn id="10" dur="1" fill="hold">
+                                          <p:stCondLst>
+                                            <p:cond delay="0"/>
+                                          </p:stCondLst>
+                                        </p:cTn>
+                                        <p:tgtEl>
+                                          <p:spTgt spid="14"/>
+                                        </p:tgtEl>
+                                        <p:attrNameLst>
+                                          <p:attrName>style.visibility</p:attrName>
+                                        </p:attrNameLst>
+                                      </p:cBhvr>
+                                      <p:to>
+                                        <p:strVal val="hidden"/>
+                                      </p:to>
+                                    </p:set>
+                                  </p:childTnLst>
+                                </p:cTn>
+                              </p:par>
+                              <p:par>
+                                <p:cTn id="11" presetID="1" presetClass="entr" presetSubtype="0" fill="hold" grpId="0" nodeType="withEffect">
+                                  <p:stCondLst>
+                                    <p:cond delay="0"/>
+                                  </p:stCondLst>
+                                  <p:childTnLst>
+                                    <p:set>
+                                      <p:cBhvr>
+                                        <p:cTn id="12" dur="1" fill="hold">
+                                          <p:stCondLst>
+                                            <p:cond delay="0"/>
+                                          </p:stCondLst>
+                                        </p:cTn>
+                                        <p:tgtEl>
+                                          <p:spTgt spid="7"/>
+                                        </p:tgtEl>
+                                        <p:attrNameLst>
+                                          <p:attrName>style.visibility</p:attrName>
+                                        </p:attrNameLst>
+                                      </p:cBhvr>
+                                      <p:to>
+                                        <p:strVal val="visible"/>
+                                      </p:to>
+                                    </p:set>
+                                  </p:childTnLst>
+                                </p:cTn>
+                              </p:par>
+                              <p:par>
+                                <p:cTn id="13" presetID="1" presetClass="entr" presetSubtype="0" fill="hold" grpId="0" nodeType="withEffect">
+                                  <p:stCondLst>
+                                    <p:cond delay="0"/>
+                                  </p:stCondLst>
+                                  <p:childTnLst>
+                                    <p:set>
+                                      <p:cBhvr>
+                                        <p:cTn id="14" dur="1" fill="hold">
+                                          <p:stCondLst>
+                                            <p:cond delay="0"/>
+                                          </p:stCondLst>
+                                        </p:cTn>
+                                        <p:tgtEl>
+                                          <p:spTgt spid="16"/>
+                                        </p:tgtEl>
+                                        <p:attrNameLst>
+                                          <p:attrName>style.visibility</p:attrName>
+                                        </p:attrNameLst>
+                                      </p:cBhvr>
+                                      <p:to>
+                                        <p:strVal val="visible"/>
+                                      </p:to>
+                                    </p:set>
+                                  </p:childTnLst>
+                                </p:cTn>
+                              </p:par>
+                            </p:childTnLst>
+                          </p:cTn>
+                        </p:par>
+                      </p:childTnLst>
+                    </p:cTn>
+                  </p:par>
+                  <p:par>
+                    <p:cTn id="15" fill="hold">
+                      <p:stCondLst>
+                        <p:cond delay="indefinite"/>
+                      </p:stCondLst>
+                      <p:childTnLst>
+                        <p:par>
+                          <p:cTn id="16" fill="hold">
+                            <p:stCondLst>
+                              <p:cond delay="0"/>
+                            </p:stCondLst>
+                            <p:childTnLst>
+                              <p:par>
+                                <p:cTn id="17" presetID="1" presetClass="exit" presetSubtype="0" fill="hold" grpId="1" nodeType="clickEffect">
+                                  <p:stCondLst>
+                                    <p:cond delay="0"/>
+                                  </p:stCondLst>
+                                  <p:childTnLst>
+                                    <p:set>
+                                      <p:cBhvr>
+                                        <p:cTn id="18" dur="1" fill="hold">
+                                          <p:stCondLst>
+                                            <p:cond delay="0"/>
+                                          </p:stCondLst>
+                                        </p:cTn>
+                                        <p:tgtEl>
+                                          <p:spTgt spid="16"/>
+                                        </p:tgtEl>
+                                        <p:attrNameLst>
+                                          <p:attrName>style.visibility</p:attrName>
+                                        </p:attrNameLst>
+                                      </p:cBhvr>
+                                      <p:to>
+                                        <p:strVal val="hidden"/>
+                                      </p:to>
+                                    </p:set>
+                                  </p:childTnLst>
+                                </p:cTn>
+                              </p:par>
+                              <p:par>
+                                <p:cTn id="19" presetID="1" presetClass="exit" presetSubtype="0" fill="hold" grpId="1" nodeType="withEffect">
+                                  <p:stCondLst>
+                                    <p:cond delay="0"/>
+                                  </p:stCondLst>
+                                  <p:childTnLst>
+                                    <p:set>
+                                      <p:cBhvr>
+                                        <p:cTn id="20" dur="1" fill="hold">
+                                          <p:stCondLst>
+                                            <p:cond delay="0"/>
+                                          </p:stCondLst>
+                                        </p:cTn>
+                                        <p:tgtEl>
+                                          <p:spTgt spid="7"/>
+                                        </p:tgtEl>
+                                        <p:attrNameLst>
+                                          <p:attrName>style.visibility</p:attrName>
+                                        </p:attrNameLst>
+                                      </p:cBhvr>
+                                      <p:to>
+                                        <p:strVal val="hidden"/>
+                                      </p:to>
+                                    </p:set>
+                                  </p:childTnLst>
+                                </p:cTn>
+                              </p:par>
+                              <p:par>
+                                <p:cTn id="21" presetID="1" presetClass="entr" presetSubtype="0" fill="hold" grpId="0" nodeType="withEffect">
+                                  <p:stCondLst>
+                                    <p:cond delay="0"/>
+                                  </p:stCondLst>
+                                  <p:childTnLst>
+                                    <p:set>
+                                      <p:cBhvr>
+                                        <p:cTn id="22" dur="1" fill="hold">
+                                          <p:stCondLst>
+                                            <p:cond delay="0"/>
+                                          </p:stCondLst>
+                                        </p:cTn>
+                                        <p:tgtEl>
+                                          <p:spTgt spid="9"/>
+                                        </p:tgtEl>
+                                        <p:attrNameLst>
+                                          <p:attrName>style.visibility</p:attrName>
+                                        </p:attrNameLst>
+                                      </p:cBhvr>
+                                      <p:to>
+                                        <p:strVal val="visible"/>
+                                      </p:to>
+                                    </p:set>
+                                  </p:childTnLst>
+                                </p:cTn>
+                              </p:par>
+                            </p:childTnLst>
+                          </p:cTn>
+                        </p:par>
+                      </p:childTnLst>
+                    </p:cTn>
+                  </p:par>
+                  <p:par>
+                    <p:cTn id="23" fill="hold">
+                      <p:stCondLst>
+                        <p:cond delay="indefinite"/>
+                      </p:stCondLst>
+                      <p:childTnLst>
+                        <p:par>
+                          <p:cTn id="24" fill="hold">
+                            <p:stCondLst>
+                              <p:cond delay="0"/>
+                            </p:stCondLst>
+                            <p:childTnLst>
+                              <p:par>
+                                <p:cTn id="25" presetID="1" presetClass="entr" presetSubtype="0" fill="hold" grpId="0" nodeType="clickEffect">
+                                  <p:stCondLst>
+                                    <p:cond delay="0"/>
+                                  </p:stCondLst>
+                                  <p:childTnLst>
+                                    <p:set>
+                                      <p:cBhvr>
+                                        <p:cTn id="26" dur="1" fill="hold">
+                                          <p:stCondLst>
+                                            <p:cond delay="0"/>
+                                          </p:stCondLst>
+                                        </p:cTn>
+                                        <p:tgtEl>
+                                          <p:spTgt spid="15"/>
+                                        </p:tgtEl>
+                                        <p:attrNameLst>
+                                          <p:attrName>style.visibility</p:attrName>
+                                        </p:attrNameLst>
+                                      </p:cBhvr>
+                                      <p:to>
+                                        <p:strVal val="visible"/>
+                                      </p:to>
+                                    </p:set>
+                                  </p:childTnLst>
+                                </p:cTn>
+                              </p:par>
+                            </p:childTnLst>
+                          </p:cTn>
+                        </p:par>
+                      </p:childTnLst>
+                    </p:cTn>
+                  </p:par>
+                  <p:par>
+                    <p:cTn id="27" fill="hold">
+                      <p:stCondLst>
+                        <p:cond delay="indefinite"/>
+                      </p:stCondLst>
+                      <p:childTnLst>
+                        <p:par>
+                          <p:cTn id="28" fill="hold">
+                            <p:stCondLst>
+                              <p:cond delay="0"/>
+                            </p:stCondLst>
+                            <p:childTnLst>
+                              <p:par>
+                                <p:cTn id="29" presetID="1" presetClass="exit" presetSubtype="0" fill="hold" grpId="1" nodeType="clickEffect">
+                                  <p:stCondLst>
+                                    <p:cond delay="0"/>
+                                  </p:stCondLst>
+                                  <p:childTnLst>
+                                    <p:set>
+                                      <p:cBhvr>
+                                        <p:cTn id="30" dur="1" fill="hold">
+                                          <p:stCondLst>
+                                            <p:cond delay="0"/>
+                                          </p:stCondLst>
+                                        </p:cTn>
+                                        <p:tgtEl>
+                                          <p:spTgt spid="15"/>
+                                        </p:tgtEl>
+                                        <p:attrNameLst>
+                                          <p:attrName>style.visibility</p:attrName>
+                                        </p:attrNameLst>
+                                      </p:cBhvr>
+                                      <p:to>
+                                        <p:strVal val="hidden"/>
+                                      </p:to>
+                                    </p:set>
+                                  </p:childTnLst>
+                                </p:cTn>
+                              </p:par>
+                              <p:par>
+                                <p:cTn id="31" presetID="1" presetClass="entr" presetSubtype="0" fill="hold" grpId="0" nodeType="withEffect">
+                                  <p:stCondLst>
+                                    <p:cond delay="0"/>
+                                  </p:stCondLst>
+                                  <p:childTnLst>
+                                    <p:set>
+                                      <p:cBhvr>
+                                        <p:cTn id="32" dur="1" fill="hold">
+                                          <p:stCondLst>
+                                            <p:cond delay="0"/>
+                                          </p:stCondLst>
+                                        </p:cTn>
+                                        <p:tgtEl>
+                                          <p:spTgt spid="17"/>
+                                        </p:tgtEl>
+                                        <p:attrNameLst>
+                                          <p:attrName>style.visibility</p:attrName>
+                                        </p:attrNameLst>
+                                      </p:cBhvr>
+                                      <p:to>
+                                        <p:strVal val="visible"/>
+                                      </p:to>
+                                    </p:set>
+                                  </p:childTnLst>
+                                </p:cTn>
+                              </p:par>
+                              <p:par>
+                                <p:cTn id="33" presetID="1" presetClass="entr" presetSubtype="0" fill="hold" grpId="0" nodeType="withEffect">
+                                  <p:stCondLst>
+                                    <p:cond delay="0"/>
+                                  </p:stCondLst>
+                                  <p:childTnLst>
+                                    <p:set>
+                                      <p:cBhvr>
+                                        <p:cTn id="34" dur="1" fill="hold">
+                                          <p:stCondLst>
+                                            <p:cond delay="0"/>
+                                          </p:stCondLst>
+                                        </p:cTn>
+                                        <p:tgtEl>
+                                          <p:spTgt spid="8"/>
+                                        </p:tgtEl>
+                                        <p:attrNameLst>
+                                          <p:attrName>style.visibility</p:attrName>
+                                        </p:attrNameLst>
+                                      </p:cBhvr>
+                                      <p:to>
+                                        <p:strVal val="visible"/>
+                                      </p:to>
+                                    </p:set>
+                                  </p:childTnLst>
+                                </p:cTn>
+                              </p:par>
+                            </p:childTnLst>
+                          </p:cTn>
+                        </p:par>
+                      </p:childTnLst>
+                    </p:cTn>
+                  </p:par>
+                  <p:par>
+                    <p:cTn id="35" fill="hold">
+                      <p:stCondLst>
+                        <p:cond delay="indefinite"/>
+                      </p:stCondLst>
+                      <p:childTnLst>
+                        <p:par>
+                          <p:cTn id="36" fill="hold">
+                            <p:stCondLst>
+                              <p:cond delay="0"/>
+                            </p:stCondLst>
+                            <p:childTnLst>
+                              <p:par>
+                                <p:cTn id="37" presetID="1" presetClass="exit" presetSubtype="0" fill="hold" grpId="1" nodeType="clickEffect">
+                                  <p:stCondLst>
+                                    <p:cond delay="0"/>
+                                  </p:stCondLst>
+                                  <p:childTnLst>
+                                    <p:set>
+                                      <p:cBhvr>
+                                        <p:cTn id="38" dur="1" fill="hold">
+                                          <p:stCondLst>
+                                            <p:cond delay="0"/>
+                                          </p:stCondLst>
+                                        </p:cTn>
+                                        <p:tgtEl>
+                                          <p:spTgt spid="17"/>
+                                        </p:tgtEl>
+                                        <p:attrNameLst>
+                                          <p:attrName>style.visibility</p:attrName>
+                                        </p:attrNameLst>
+                                      </p:cBhvr>
+                                      <p:to>
+                                        <p:strVal val="hidden"/>
+                                      </p:to>
+                                    </p:set>
+                                  </p:childTnLst>
+                                </p:cTn>
+                              </p:par>
+                              <p:par>
+                                <p:cTn id="39" presetID="1" presetClass="exit" presetSubtype="0" fill="hold" grpId="1" nodeType="withEffect">
+                                  <p:stCondLst>
+                                    <p:cond delay="0"/>
+                                  </p:stCondLst>
+                                  <p:childTnLst>
+                                    <p:set>
+                                      <p:cBhvr>
+                                        <p:cTn id="40" dur="1" fill="hold">
+                                          <p:stCondLst>
+                                            <p:cond delay="0"/>
+                                          </p:stCondLst>
+                                        </p:cTn>
+                                        <p:tgtEl>
+                                          <p:spTgt spid="8"/>
+                                        </p:tgtEl>
+                                        <p:attrNameLst>
+                                          <p:attrName>style.visibility</p:attrName>
+                                        </p:attrNameLst>
+                                      </p:cBhvr>
+                                      <p:to>
+                                        <p:strVal val="hidden"/>
+                                      </p:to>
+                                    </p:set>
+                                  </p:childTnLst>
+                                </p:cTn>
+                              </p:par>
+                              <p:par>
+                                <p:cTn id="41" presetID="1" presetClass="entr" presetSubtype="0" fill="hold" grpId="0" nodeType="withEffect">
+                                  <p:stCondLst>
+                                    <p:cond delay="0"/>
+                                  </p:stCondLst>
+                                  <p:childTnLst>
+                                    <p:set>
+                                      <p:cBhvr>
+                                        <p:cTn id="42" dur="1" fill="hold">
+                                          <p:stCondLst>
+                                            <p:cond delay="0"/>
+                                          </p:stCondLst>
+                                        </p:cTn>
+                                        <p:tgtEl>
+                                          <p:spTgt spid="18"/>
+                                        </p:tgtEl>
+                                        <p:attrNameLst>
+                                          <p:attrName>style.visibility</p:attrName>
+                                        </p:attrNameLst>
+                                      </p:cBhvr>
+                                      <p:to>
+                                        <p:strVal val="visible"/>
+                                      </p:to>
+                                    </p:set>
+                                  </p:childTnLst>
+                                </p:cTn>
+                              </p:par>
+                            </p:childTnLst>
+                          </p:cTn>
+                        </p:par>
+                      </p:childTnLst>
+                    </p:cTn>
+                  </p:par>
+                  <p:par>
+                    <p:cTn id="43" fill="hold">
+                      <p:stCondLst>
+                        <p:cond delay="indefinite"/>
+                      </p:stCondLst>
+                      <p:childTnLst>
+                        <p:par>
+                          <p:cTn id="44" fill="hold">
+                            <p:stCondLst>
+                              <p:cond delay="0"/>
+                            </p:stCondLst>
+                            <p:childTnLst>
+                              <p:par>
+                                <p:cTn id="45" presetID="10" presetClass="exit" presetSubtype="0" fill="hold" grpId="0" nodeType="clickEffect">
+                                  <p:stCondLst>
+                                    <p:cond delay="0"/>
+                                  </p:stCondLst>
+                                  <p:childTnLst>
+                                    <p:animEffect transition="out" filter="fade">
+                                      <p:cBhvr>
+                                        <p:cTn id="46" dur="500"/>
+                                        <p:tgtEl>
+                                          <p:spTgt spid="5"/>
+                                        </p:tgtEl>
+                                      </p:cBhvr>
+                                    </p:animEffect>
+                                    <p:set>
+                                      <p:cBhvr>
+                                        <p:cTn id="47" dur="1" fill="hold">
+                                          <p:stCondLst>
+                                            <p:cond delay="499"/>
+                                          </p:stCondLst>
+                                        </p:cTn>
+                                        <p:tgtEl>
+                                          <p:spTgt spid="5"/>
+                                        </p:tgtEl>
+                                        <p:attrNameLst>
+                                          <p:attrName>style.visibility</p:attrName>
+                                        </p:attrNameLst>
+                                      </p:cBhvr>
+                                      <p:to>
+                                        <p:strVal val="hidden"/>
+                                      </p:to>
+                                    </p:set>
+                                  </p:childTnLst>
+                                </p:cTn>
+                              </p:par>
+                              <p:par>
+                                <p:cTn id="48" presetID="10" presetClass="entr" presetSubtype="0" fill="hold" grpId="0" nodeType="withEffect">
+                                  <p:stCondLst>
+                                    <p:cond delay="0"/>
+                                  </p:stCondLst>
+                                  <p:childTnLst>
+                                    <p:set>
+                                      <p:cBhvr>
+                                        <p:cTn id="49" dur="1" fill="hold">
+                                          <p:stCondLst>
+                                            <p:cond delay="0"/>
+                                          </p:stCondLst>
+                                        </p:cTn>
+                                        <p:tgtEl>
+                                          <p:spTgt spid="21"/>
+                                        </p:tgtEl>
+                                        <p:attrNameLst>
+                                          <p:attrName>style.visibility</p:attrName>
+                                        </p:attrNameLst>
+                                      </p:cBhvr>
+                                      <p:to>
+                                        <p:strVal val="visible"/>
+                                      </p:to>
+                                    </p:set>
+                                    <p:animEffect transition="in" filter="fade">
+                                      <p:cBhvr>
+                                        <p:cTn id="50" dur="500"/>
+                                        <p:tgtEl>
+                                          <p:spTgt spid="21"/>
+                                        </p:tgtEl>
+                                      </p:cBhvr>
+                                    </p:animEffect>
+                                  </p:childTnLst>
+                                </p:cTn>
+                              </p:par>
+                            </p:childTnLst>
+                          </p:cTn>
+                        </p:par>
+                      </p:childTnLst>
+                    </p:cTn>
+                  </p:par>
+                </p:childTnLst>
+              </p:cTn>
+              <p:prevCondLst>
+                <p:cond evt="onPrev" delay="0">
+                  <p:tgtEl>
+                    <p:sldTgt/>
+                  </p:tgtEl>
+                </p:cond>
+              </p:prevCondLst>
+              <p:nextCondLst>
+                <p:cond evt="onNext" delay="0">
+                  <p:tgtEl>
+                    <p:sldTgt/>
+                  </p:tgtEl>
+                </p:cond>
+              </p:nextCondLst>
+            </p:seq>
+          </p:childTnLst>
+        </p:cTn>
+      </p:par>
+    </p:tnLst>
+    <p:bldLst>
+      <p:bldP spid="5" grpId="0" animBg="1"/>
+      <p:bldP spid="7" grpId="0" animBg="1"/>
+      <p:bldP spid="7" grpId="1" animBg="1"/>
+      <p:bldP spid="8" grpId="0" animBg="1"/>
+      <p:bldP spid="8" grpId="1" animBg="1"/>
+      <p:bldP spid="9" grpId="0" animBg="1"/>
+      <p:bldP spid="14" grpId="0" animBg="1"/>
+      <p:bldP spid="14" grpId="1" animBg="1"/>
+      <p:bldP spid="15" grpId="0" animBg="1"/>
+      <p:bldP spid="15" grpId="1" animBg="1"/>
+      <p:bldP spid="16" grpId="0" animBg="1"/>
+      <p:bldP spid="16" grpId="1" animBg="1"/>
+      <p:bldP spid="17" grpId="0" animBg="1"/>
+      <p:bldP spid="17" grpId="1" animBg="1"/>
+      <p:bldP spid="18" grpId="0" animBg="1"/>
+      <p:bldP spid="21" grpId="0" animBg="1"/>
+    </p:bldLst>
+  </p:timing>
 </p:sld>
 </file>
 
@@ -3697,7 +5027,7 @@
           <p:cNvPr id="2" name="Title 1">
             <a:extLst>
               <a:ext uri="{FF2B5EF4-FFF2-40B4-BE49-F238E27FC236}">
-                <a16:creationId xmlns:a16="http://schemas.microsoft.com/office/drawing/2014/main" id="{D9EC165F-ACC2-4E74-AD68-984B43F5522C}"/>
+                <a16:creationId xmlns:a16="http://schemas.microsoft.com/office/drawing/2014/main" id="{BCF2DB21-1BC6-4880-BA0B-4A5BAFAB655A}"/>
               </a:ext>
             </a:extLst>
           </p:cNvPr>
@@ -3708,12 +5038,7 @@
             <p:ph type="title"/>
           </p:nvPr>
         </p:nvSpPr>
-        <p:spPr>
-          <a:xfrm>
-            <a:off x="2610195" y="512749"/>
-            <a:ext cx="9134392" cy="636559"/>
-          </a:xfrm>
-        </p:spPr>
+        <p:spPr/>
         <p:txBody>
           <a:bodyPr>
             <a:normAutofit fontScale="90000"/>
@@ -3722,7 +5047,7 @@
           <a:p>
             <a:r>
               <a:rPr lang="en-US" dirty="0"/>
-              <a:t>DI and Inversion Of Control containers (IOC)</a:t>
+              <a:t>DI in the real (non IT) world</a:t>
             </a:r>
             <a:endParaRPr lang="nl-BE" dirty="0"/>
           </a:p>
@@ -3730,55 +5055,1654 @@
       </p:sp>
       <p:sp>
         <p:nvSpPr>
-          <p:cNvPr id="3" name="Content Placeholder 2">
-            <a:extLst>
-              <a:ext uri="{FF2B5EF4-FFF2-40B4-BE49-F238E27FC236}">
-                <a16:creationId xmlns:a16="http://schemas.microsoft.com/office/drawing/2014/main" id="{AB274DF0-3CA1-45BD-B8AF-C79B08964714}"/>
-              </a:ext>
-            </a:extLst>
-          </p:cNvPr>
-          <p:cNvSpPr>
-            <a:spLocks noGrp="1"/>
-          </p:cNvSpPr>
-          <p:nvPr>
-            <p:ph idx="1"/>
-          </p:nvPr>
-        </p:nvSpPr>
-        <p:spPr/>
-        <p:txBody>
-          <a:bodyPr/>
+          <p:cNvPr id="3" name="Rectangle 2">
+            <a:extLst>
+              <a:ext uri="{FF2B5EF4-FFF2-40B4-BE49-F238E27FC236}">
+                <a16:creationId xmlns:a16="http://schemas.microsoft.com/office/drawing/2014/main" id="{FB28270C-9748-420C-B147-957F079C505E}"/>
+              </a:ext>
+            </a:extLst>
+          </p:cNvPr>
+          <p:cNvSpPr/>
+          <p:nvPr/>
+        </p:nvSpPr>
+        <p:spPr>
+          <a:xfrm>
+            <a:off x="3934436" y="1602297"/>
+            <a:ext cx="5184396" cy="2709644"/>
+          </a:xfrm>
+          <a:prstGeom prst="rect">
+            <a:avLst/>
+          </a:prstGeom>
+        </p:spPr>
+        <p:style>
+          <a:lnRef idx="2">
+            <a:schemeClr val="accent3">
+              <a:shade val="50000"/>
+            </a:schemeClr>
+          </a:lnRef>
+          <a:fillRef idx="1">
+            <a:schemeClr val="accent3"/>
+          </a:fillRef>
+          <a:effectRef idx="0">
+            <a:schemeClr val="accent3"/>
+          </a:effectRef>
+          <a:fontRef idx="minor">
+            <a:schemeClr val="lt1"/>
+          </a:fontRef>
+        </p:style>
+        <p:txBody>
+          <a:bodyPr rtlCol="0" anchor="ctr"/>
+          <a:lstStyle/>
+          <a:p>
+            <a:pPr algn="ctr"/>
+            <a:endParaRPr lang="nl-BE"/>
+          </a:p>
+        </p:txBody>
+      </p:sp>
+      <p:sp>
+        <p:nvSpPr>
+          <p:cNvPr id="4" name="TextBox 3">
+            <a:extLst>
+              <a:ext uri="{FF2B5EF4-FFF2-40B4-BE49-F238E27FC236}">
+                <a16:creationId xmlns:a16="http://schemas.microsoft.com/office/drawing/2014/main" id="{5F95816C-FDAC-4DB3-9F0C-823698C82BAA}"/>
+              </a:ext>
+            </a:extLst>
+          </p:cNvPr>
+          <p:cNvSpPr txBox="1"/>
+          <p:nvPr/>
+        </p:nvSpPr>
+        <p:spPr>
+          <a:xfrm>
+            <a:off x="5603845" y="1660912"/>
+            <a:ext cx="2248250" cy="369332"/>
+          </a:xfrm>
+          <a:prstGeom prst="rect">
+            <a:avLst/>
+          </a:prstGeom>
+          <a:noFill/>
+        </p:spPr>
+        <p:txBody>
+          <a:bodyPr wrap="square" rtlCol="0">
+            <a:spAutoFit/>
+          </a:bodyPr>
           <a:lstStyle/>
           <a:p>
             <a:r>
               <a:rPr lang="en-US" dirty="0"/>
-              <a:t>Optional tool</a:t>
-            </a:r>
-          </a:p>
-          <a:p>
-            <a:r>
-              <a:rPr lang="en-US" dirty="0"/>
-              <a:t>Central place to manage the creation of your dependencies</a:t>
-            </a:r>
-          </a:p>
-          <a:p>
-            <a:r>
-              <a:rPr lang="en-US" dirty="0"/>
-              <a:t>Umbraco 8 and mvc.net core have it baked in</a:t>
+              <a:t>Construction yard</a:t>
             </a:r>
             <a:endParaRPr lang="nl-BE" dirty="0"/>
+          </a:p>
+        </p:txBody>
+      </p:sp>
+      <p:sp>
+        <p:nvSpPr>
+          <p:cNvPr id="5" name="Smiley Face 4">
+            <a:extLst>
+              <a:ext uri="{FF2B5EF4-FFF2-40B4-BE49-F238E27FC236}">
+                <a16:creationId xmlns:a16="http://schemas.microsoft.com/office/drawing/2014/main" id="{9B6DE02C-6B3A-434B-AD78-2ABAB091929F}"/>
+              </a:ext>
+            </a:extLst>
+          </p:cNvPr>
+          <p:cNvSpPr/>
+          <p:nvPr/>
+        </p:nvSpPr>
+        <p:spPr>
+          <a:xfrm>
+            <a:off x="3506600" y="2030244"/>
+            <a:ext cx="360726" cy="377505"/>
+          </a:xfrm>
+          <a:prstGeom prst="smileyFace">
+            <a:avLst>
+              <a:gd name="adj" fmla="val 4653"/>
+            </a:avLst>
+          </a:prstGeom>
+          <a:solidFill>
+            <a:schemeClr val="bg1"/>
+          </a:solidFill>
+          <a:ln>
+            <a:solidFill>
+              <a:schemeClr val="tx1"/>
+            </a:solidFill>
+          </a:ln>
+        </p:spPr>
+        <p:style>
+          <a:lnRef idx="2">
+            <a:schemeClr val="accent1">
+              <a:shade val="50000"/>
+            </a:schemeClr>
+          </a:lnRef>
+          <a:fillRef idx="1">
+            <a:schemeClr val="accent1"/>
+          </a:fillRef>
+          <a:effectRef idx="0">
+            <a:schemeClr val="accent1"/>
+          </a:effectRef>
+          <a:fontRef idx="minor">
+            <a:schemeClr val="lt1"/>
+          </a:fontRef>
+        </p:style>
+        <p:txBody>
+          <a:bodyPr rtlCol="0" anchor="ctr"/>
+          <a:lstStyle/>
+          <a:p>
+            <a:pPr algn="ctr"/>
+            <a:endParaRPr lang="nl-BE"/>
+          </a:p>
+        </p:txBody>
+      </p:sp>
+      <p:sp>
+        <p:nvSpPr>
+          <p:cNvPr id="7" name="Smiley Face 6">
+            <a:extLst>
+              <a:ext uri="{FF2B5EF4-FFF2-40B4-BE49-F238E27FC236}">
+                <a16:creationId xmlns:a16="http://schemas.microsoft.com/office/drawing/2014/main" id="{487F29D2-7F6E-4EAA-9DFC-53B7D4850756}"/>
+              </a:ext>
+            </a:extLst>
+          </p:cNvPr>
+          <p:cNvSpPr/>
+          <p:nvPr/>
+        </p:nvSpPr>
+        <p:spPr>
+          <a:xfrm>
+            <a:off x="704677" y="2030243"/>
+            <a:ext cx="360726" cy="377505"/>
+          </a:xfrm>
+          <a:prstGeom prst="smileyFace">
+            <a:avLst>
+              <a:gd name="adj" fmla="val 4653"/>
+            </a:avLst>
+          </a:prstGeom>
+          <a:solidFill>
+            <a:schemeClr val="bg1">
+              <a:lumMod val="85000"/>
+            </a:schemeClr>
+          </a:solidFill>
+          <a:ln>
+            <a:solidFill>
+              <a:schemeClr val="tx1"/>
+            </a:solidFill>
+          </a:ln>
+        </p:spPr>
+        <p:style>
+          <a:lnRef idx="2">
+            <a:schemeClr val="accent1">
+              <a:shade val="50000"/>
+            </a:schemeClr>
+          </a:lnRef>
+          <a:fillRef idx="1">
+            <a:schemeClr val="accent1"/>
+          </a:fillRef>
+          <a:effectRef idx="0">
+            <a:schemeClr val="accent1"/>
+          </a:effectRef>
+          <a:fontRef idx="minor">
+            <a:schemeClr val="lt1"/>
+          </a:fontRef>
+        </p:style>
+        <p:txBody>
+          <a:bodyPr rtlCol="0" anchor="ctr"/>
+          <a:lstStyle/>
+          <a:p>
+            <a:pPr algn="ctr"/>
+            <a:endParaRPr lang="nl-BE"/>
+          </a:p>
+        </p:txBody>
+      </p:sp>
+      <p:sp>
+        <p:nvSpPr>
+          <p:cNvPr id="8" name="Smiley Face 7">
+            <a:extLst>
+              <a:ext uri="{FF2B5EF4-FFF2-40B4-BE49-F238E27FC236}">
+                <a16:creationId xmlns:a16="http://schemas.microsoft.com/office/drawing/2014/main" id="{AD56CAEB-F057-4E7F-9E69-5FF8BB98861C}"/>
+              </a:ext>
+            </a:extLst>
+          </p:cNvPr>
+          <p:cNvSpPr/>
+          <p:nvPr/>
+        </p:nvSpPr>
+        <p:spPr>
+          <a:xfrm>
+            <a:off x="998292" y="3429000"/>
+            <a:ext cx="360726" cy="377505"/>
+          </a:xfrm>
+          <a:prstGeom prst="smileyFace">
+            <a:avLst>
+              <a:gd name="adj" fmla="val 4653"/>
+            </a:avLst>
+          </a:prstGeom>
+          <a:solidFill>
+            <a:srgbClr val="CC99FF"/>
+          </a:solidFill>
+          <a:ln>
+            <a:solidFill>
+              <a:schemeClr val="tx1"/>
+            </a:solidFill>
+          </a:ln>
+        </p:spPr>
+        <p:style>
+          <a:lnRef idx="2">
+            <a:schemeClr val="accent1">
+              <a:shade val="50000"/>
+            </a:schemeClr>
+          </a:lnRef>
+          <a:fillRef idx="1">
+            <a:schemeClr val="accent1"/>
+          </a:fillRef>
+          <a:effectRef idx="0">
+            <a:schemeClr val="accent1"/>
+          </a:effectRef>
+          <a:fontRef idx="minor">
+            <a:schemeClr val="lt1"/>
+          </a:fontRef>
+        </p:style>
+        <p:txBody>
+          <a:bodyPr rtlCol="0" anchor="ctr"/>
+          <a:lstStyle/>
+          <a:p>
+            <a:pPr algn="ctr"/>
+            <a:endParaRPr lang="nl-BE"/>
+          </a:p>
+        </p:txBody>
+      </p:sp>
+      <p:sp>
+        <p:nvSpPr>
+          <p:cNvPr id="9" name="Smiley Face 8">
+            <a:extLst>
+              <a:ext uri="{FF2B5EF4-FFF2-40B4-BE49-F238E27FC236}">
+                <a16:creationId xmlns:a16="http://schemas.microsoft.com/office/drawing/2014/main" id="{1E5E5087-3247-4942-B2C4-58363806702B}"/>
+              </a:ext>
+            </a:extLst>
+          </p:cNvPr>
+          <p:cNvSpPr/>
+          <p:nvPr/>
+        </p:nvSpPr>
+        <p:spPr>
+          <a:xfrm>
+            <a:off x="5100508" y="2548154"/>
+            <a:ext cx="360726" cy="377505"/>
+          </a:xfrm>
+          <a:prstGeom prst="smileyFace">
+            <a:avLst>
+              <a:gd name="adj" fmla="val 4653"/>
+            </a:avLst>
+          </a:prstGeom>
+          <a:solidFill>
+            <a:schemeClr val="bg1">
+              <a:lumMod val="85000"/>
+            </a:schemeClr>
+          </a:solidFill>
+          <a:ln>
+            <a:solidFill>
+              <a:schemeClr val="tx1"/>
+            </a:solidFill>
+          </a:ln>
+        </p:spPr>
+        <p:style>
+          <a:lnRef idx="2">
+            <a:schemeClr val="accent1">
+              <a:shade val="50000"/>
+            </a:schemeClr>
+          </a:lnRef>
+          <a:fillRef idx="1">
+            <a:schemeClr val="accent1"/>
+          </a:fillRef>
+          <a:effectRef idx="0">
+            <a:schemeClr val="accent1"/>
+          </a:effectRef>
+          <a:fontRef idx="minor">
+            <a:schemeClr val="lt1"/>
+          </a:fontRef>
+        </p:style>
+        <p:txBody>
+          <a:bodyPr rtlCol="0" anchor="ctr"/>
+          <a:lstStyle/>
+          <a:p>
+            <a:pPr algn="ctr"/>
+            <a:endParaRPr lang="nl-BE"/>
+          </a:p>
+        </p:txBody>
+      </p:sp>
+      <p:sp>
+        <p:nvSpPr>
+          <p:cNvPr id="14" name="Speech Bubble: Rectangle 13">
+            <a:extLst>
+              <a:ext uri="{FF2B5EF4-FFF2-40B4-BE49-F238E27FC236}">
+                <a16:creationId xmlns:a16="http://schemas.microsoft.com/office/drawing/2014/main" id="{8C1D01B8-17BB-406C-B974-235CA6654C6B}"/>
+              </a:ext>
+            </a:extLst>
+          </p:cNvPr>
+          <p:cNvSpPr/>
+          <p:nvPr/>
+        </p:nvSpPr>
+        <p:spPr>
+          <a:xfrm>
+            <a:off x="3219275" y="1084293"/>
+            <a:ext cx="1430321" cy="693140"/>
+          </a:xfrm>
+          <a:prstGeom prst="wedgeRectCallout">
+            <a:avLst/>
+          </a:prstGeom>
+          <a:solidFill>
+            <a:schemeClr val="bg1"/>
+          </a:solidFill>
+        </p:spPr>
+        <p:style>
+          <a:lnRef idx="2">
+            <a:schemeClr val="accent1">
+              <a:shade val="50000"/>
+            </a:schemeClr>
+          </a:lnRef>
+          <a:fillRef idx="1">
+            <a:schemeClr val="accent1"/>
+          </a:fillRef>
+          <a:effectRef idx="0">
+            <a:schemeClr val="accent1"/>
+          </a:effectRef>
+          <a:fontRef idx="minor">
+            <a:schemeClr val="lt1"/>
+          </a:fontRef>
+        </p:style>
+        <p:txBody>
+          <a:bodyPr rtlCol="0" anchor="ctr"/>
+          <a:lstStyle/>
+          <a:p>
+            <a:pPr algn="ctr"/>
+            <a:r>
+              <a:rPr lang="en-US" dirty="0">
+                <a:solidFill>
+                  <a:schemeClr val="tx1"/>
+                </a:solidFill>
+              </a:rPr>
+              <a:t>I need a new worker</a:t>
+            </a:r>
+            <a:endParaRPr lang="nl-BE" dirty="0">
+              <a:solidFill>
+                <a:schemeClr val="tx1"/>
+              </a:solidFill>
+            </a:endParaRPr>
+          </a:p>
+        </p:txBody>
+      </p:sp>
+      <p:sp>
+        <p:nvSpPr>
+          <p:cNvPr id="15" name="Speech Bubble: Rectangle 14">
+            <a:extLst>
+              <a:ext uri="{FF2B5EF4-FFF2-40B4-BE49-F238E27FC236}">
+                <a16:creationId xmlns:a16="http://schemas.microsoft.com/office/drawing/2014/main" id="{7B9C1EDE-8A8F-4778-A91F-652B3E39FCCC}"/>
+              </a:ext>
+            </a:extLst>
+          </p:cNvPr>
+          <p:cNvSpPr/>
+          <p:nvPr/>
+        </p:nvSpPr>
+        <p:spPr>
+          <a:xfrm>
+            <a:off x="3219275" y="1126046"/>
+            <a:ext cx="1652631" cy="693140"/>
+          </a:xfrm>
+          <a:prstGeom prst="wedgeRectCallout">
+            <a:avLst/>
+          </a:prstGeom>
+          <a:solidFill>
+            <a:schemeClr val="bg1"/>
+          </a:solidFill>
+        </p:spPr>
+        <p:style>
+          <a:lnRef idx="2">
+            <a:schemeClr val="accent1">
+              <a:shade val="50000"/>
+            </a:schemeClr>
+          </a:lnRef>
+          <a:fillRef idx="1">
+            <a:schemeClr val="accent1"/>
+          </a:fillRef>
+          <a:effectRef idx="0">
+            <a:schemeClr val="accent1"/>
+          </a:effectRef>
+          <a:fontRef idx="minor">
+            <a:schemeClr val="lt1"/>
+          </a:fontRef>
+        </p:style>
+        <p:txBody>
+          <a:bodyPr rtlCol="0" anchor="ctr"/>
+          <a:lstStyle/>
+          <a:p>
+            <a:pPr algn="ctr"/>
+            <a:r>
+              <a:rPr lang="en-US" dirty="0">
+                <a:solidFill>
+                  <a:schemeClr val="tx1"/>
+                </a:solidFill>
+              </a:rPr>
+              <a:t>I need another worker</a:t>
+            </a:r>
+            <a:endParaRPr lang="nl-BE" dirty="0">
+              <a:solidFill>
+                <a:schemeClr val="tx1"/>
+              </a:solidFill>
+            </a:endParaRPr>
+          </a:p>
+        </p:txBody>
+      </p:sp>
+      <p:sp>
+        <p:nvSpPr>
+          <p:cNvPr id="16" name="Speech Bubble: Rectangle 15">
+            <a:extLst>
+              <a:ext uri="{FF2B5EF4-FFF2-40B4-BE49-F238E27FC236}">
+                <a16:creationId xmlns:a16="http://schemas.microsoft.com/office/drawing/2014/main" id="{B7EE4373-89BB-43EA-ADDD-4ACC5D40438B}"/>
+              </a:ext>
+            </a:extLst>
+          </p:cNvPr>
+          <p:cNvSpPr/>
+          <p:nvPr/>
+        </p:nvSpPr>
+        <p:spPr>
+          <a:xfrm>
+            <a:off x="286447" y="1151992"/>
+            <a:ext cx="2114024" cy="693140"/>
+          </a:xfrm>
+          <a:prstGeom prst="wedgeRectCallout">
+            <a:avLst/>
+          </a:prstGeom>
+          <a:solidFill>
+            <a:schemeClr val="bg1"/>
+          </a:solidFill>
+        </p:spPr>
+        <p:style>
+          <a:lnRef idx="2">
+            <a:schemeClr val="accent1">
+              <a:shade val="50000"/>
+            </a:schemeClr>
+          </a:lnRef>
+          <a:fillRef idx="1">
+            <a:schemeClr val="accent1"/>
+          </a:fillRef>
+          <a:effectRef idx="0">
+            <a:schemeClr val="accent1"/>
+          </a:effectRef>
+          <a:fontRef idx="minor">
+            <a:schemeClr val="lt1"/>
+          </a:fontRef>
+        </p:style>
+        <p:txBody>
+          <a:bodyPr rtlCol="0" anchor="ctr"/>
+          <a:lstStyle/>
+          <a:p>
+            <a:pPr algn="ctr"/>
+            <a:r>
+              <a:rPr lang="en-US" dirty="0">
+                <a:solidFill>
+                  <a:schemeClr val="tx1"/>
+                </a:solidFill>
+              </a:rPr>
+              <a:t>Sup boss, Can I have the tools I need?</a:t>
+            </a:r>
+            <a:endParaRPr lang="nl-BE" dirty="0">
+              <a:solidFill>
+                <a:schemeClr val="tx1"/>
+              </a:solidFill>
+            </a:endParaRPr>
+          </a:p>
+        </p:txBody>
+      </p:sp>
+      <p:sp>
+        <p:nvSpPr>
+          <p:cNvPr id="17" name="Speech Bubble: Rectangle 16">
+            <a:extLst>
+              <a:ext uri="{FF2B5EF4-FFF2-40B4-BE49-F238E27FC236}">
+                <a16:creationId xmlns:a16="http://schemas.microsoft.com/office/drawing/2014/main" id="{A4524628-C6E9-4945-9025-62291C68407E}"/>
+              </a:ext>
+            </a:extLst>
+          </p:cNvPr>
+          <p:cNvSpPr/>
+          <p:nvPr/>
+        </p:nvSpPr>
+        <p:spPr>
+          <a:xfrm>
+            <a:off x="713067" y="2592859"/>
+            <a:ext cx="1652631" cy="693140"/>
+          </a:xfrm>
+          <a:prstGeom prst="wedgeRectCallout">
+            <a:avLst/>
+          </a:prstGeom>
+          <a:solidFill>
+            <a:schemeClr val="bg1"/>
+          </a:solidFill>
+        </p:spPr>
+        <p:style>
+          <a:lnRef idx="2">
+            <a:schemeClr val="accent1">
+              <a:shade val="50000"/>
+            </a:schemeClr>
+          </a:lnRef>
+          <a:fillRef idx="1">
+            <a:schemeClr val="accent1"/>
+          </a:fillRef>
+          <a:effectRef idx="0">
+            <a:schemeClr val="accent1"/>
+          </a:effectRef>
+          <a:fontRef idx="minor">
+            <a:schemeClr val="lt1"/>
+          </a:fontRef>
+        </p:style>
+        <p:txBody>
+          <a:bodyPr rtlCol="0" anchor="ctr"/>
+          <a:lstStyle/>
+          <a:p>
+            <a:pPr algn="ctr"/>
+            <a:r>
+              <a:rPr lang="en-US" dirty="0">
+                <a:solidFill>
+                  <a:schemeClr val="tx1"/>
+                </a:solidFill>
+              </a:rPr>
+              <a:t>Ready to work if I get my tools</a:t>
+            </a:r>
+            <a:endParaRPr lang="nl-BE" dirty="0">
+              <a:solidFill>
+                <a:schemeClr val="tx1"/>
+              </a:solidFill>
+            </a:endParaRPr>
+          </a:p>
+        </p:txBody>
+      </p:sp>
+      <p:sp>
+        <p:nvSpPr>
+          <p:cNvPr id="18" name="Smiley Face 17">
+            <a:extLst>
+              <a:ext uri="{FF2B5EF4-FFF2-40B4-BE49-F238E27FC236}">
+                <a16:creationId xmlns:a16="http://schemas.microsoft.com/office/drawing/2014/main" id="{07E55897-D22C-4124-B72B-F4E833CB6A36}"/>
+              </a:ext>
+            </a:extLst>
+          </p:cNvPr>
+          <p:cNvSpPr/>
+          <p:nvPr/>
+        </p:nvSpPr>
+        <p:spPr>
+          <a:xfrm>
+            <a:off x="6346271" y="3504501"/>
+            <a:ext cx="360726" cy="377505"/>
+          </a:xfrm>
+          <a:prstGeom prst="smileyFace">
+            <a:avLst>
+              <a:gd name="adj" fmla="val 4653"/>
+            </a:avLst>
+          </a:prstGeom>
+          <a:solidFill>
+            <a:srgbClr val="CC99FF"/>
+          </a:solidFill>
+          <a:ln>
+            <a:solidFill>
+              <a:schemeClr val="tx1"/>
+            </a:solidFill>
+          </a:ln>
+        </p:spPr>
+        <p:style>
+          <a:lnRef idx="2">
+            <a:schemeClr val="accent1">
+              <a:shade val="50000"/>
+            </a:schemeClr>
+          </a:lnRef>
+          <a:fillRef idx="1">
+            <a:schemeClr val="accent1"/>
+          </a:fillRef>
+          <a:effectRef idx="0">
+            <a:schemeClr val="accent1"/>
+          </a:effectRef>
+          <a:fontRef idx="minor">
+            <a:schemeClr val="lt1"/>
+          </a:fontRef>
+        </p:style>
+        <p:txBody>
+          <a:bodyPr rtlCol="0" anchor="ctr"/>
+          <a:lstStyle/>
+          <a:p>
+            <a:pPr algn="ctr"/>
+            <a:endParaRPr lang="nl-BE"/>
+          </a:p>
+        </p:txBody>
+      </p:sp>
+      <p:cxnSp>
+        <p:nvCxnSpPr>
+          <p:cNvPr id="20" name="Straight Connector 19">
+            <a:extLst>
+              <a:ext uri="{FF2B5EF4-FFF2-40B4-BE49-F238E27FC236}">
+                <a16:creationId xmlns:a16="http://schemas.microsoft.com/office/drawing/2014/main" id="{EA3FD00A-E989-4416-884A-F2D2BABC3FC9}"/>
+              </a:ext>
+            </a:extLst>
+          </p:cNvPr>
+          <p:cNvCxnSpPr>
+            <a:cxnSpLocks/>
+          </p:cNvCxnSpPr>
+          <p:nvPr/>
+        </p:nvCxnSpPr>
+        <p:spPr>
+          <a:xfrm flipH="1">
+            <a:off x="3333576" y="3245872"/>
+            <a:ext cx="585219" cy="466258"/>
+          </a:xfrm>
+          <a:prstGeom prst="line">
+            <a:avLst/>
+          </a:prstGeom>
+        </p:spPr>
+        <p:style>
+          <a:lnRef idx="1">
+            <a:schemeClr val="accent1"/>
+          </a:lnRef>
+          <a:fillRef idx="0">
+            <a:schemeClr val="accent1"/>
+          </a:fillRef>
+          <a:effectRef idx="0">
+            <a:schemeClr val="accent1"/>
+          </a:effectRef>
+          <a:fontRef idx="minor">
+            <a:schemeClr val="tx1"/>
+          </a:fontRef>
+        </p:style>
+      </p:cxnSp>
+      <p:sp>
+        <p:nvSpPr>
+          <p:cNvPr id="21" name="Smiley Face 20">
+            <a:extLst>
+              <a:ext uri="{FF2B5EF4-FFF2-40B4-BE49-F238E27FC236}">
+                <a16:creationId xmlns:a16="http://schemas.microsoft.com/office/drawing/2014/main" id="{33A49058-5B2B-4DD1-9BC0-7502A0405B52}"/>
+              </a:ext>
+            </a:extLst>
+          </p:cNvPr>
+          <p:cNvSpPr/>
+          <p:nvPr/>
+        </p:nvSpPr>
+        <p:spPr>
+          <a:xfrm>
+            <a:off x="3506599" y="2030568"/>
+            <a:ext cx="360726" cy="377505"/>
+          </a:xfrm>
+          <a:prstGeom prst="smileyFace">
+            <a:avLst>
+              <a:gd name="adj" fmla="val 4653"/>
+            </a:avLst>
+          </a:prstGeom>
+          <a:solidFill>
+            <a:srgbClr val="92D050"/>
+          </a:solidFill>
+          <a:ln>
+            <a:solidFill>
+              <a:schemeClr val="tx1"/>
+            </a:solidFill>
+          </a:ln>
+        </p:spPr>
+        <p:style>
+          <a:lnRef idx="2">
+            <a:schemeClr val="accent1">
+              <a:shade val="50000"/>
+            </a:schemeClr>
+          </a:lnRef>
+          <a:fillRef idx="1">
+            <a:schemeClr val="accent1"/>
+          </a:fillRef>
+          <a:effectRef idx="0">
+            <a:schemeClr val="accent1"/>
+          </a:effectRef>
+          <a:fontRef idx="minor">
+            <a:schemeClr val="lt1"/>
+          </a:fontRef>
+        </p:style>
+        <p:txBody>
+          <a:bodyPr rtlCol="0" anchor="ctr"/>
+          <a:lstStyle/>
+          <a:p>
+            <a:pPr algn="ctr"/>
+            <a:endParaRPr lang="nl-BE"/>
+          </a:p>
+        </p:txBody>
+      </p:sp>
+      <p:sp>
+        <p:nvSpPr>
+          <p:cNvPr id="19" name="Speech Bubble: Rectangle 18">
+            <a:extLst>
+              <a:ext uri="{FF2B5EF4-FFF2-40B4-BE49-F238E27FC236}">
+                <a16:creationId xmlns:a16="http://schemas.microsoft.com/office/drawing/2014/main" id="{43BD48A2-5EBD-4494-8272-742483876A15}"/>
+              </a:ext>
+            </a:extLst>
+          </p:cNvPr>
+          <p:cNvSpPr/>
+          <p:nvPr/>
+        </p:nvSpPr>
+        <p:spPr>
+          <a:xfrm>
+            <a:off x="3185719" y="1255032"/>
+            <a:ext cx="1881233" cy="1300954"/>
+          </a:xfrm>
+          <a:prstGeom prst="wedgeRectCallout">
+            <a:avLst/>
+          </a:prstGeom>
+          <a:solidFill>
+            <a:schemeClr val="bg1"/>
+          </a:solidFill>
+        </p:spPr>
+        <p:style>
+          <a:lnRef idx="2">
+            <a:schemeClr val="accent1">
+              <a:shade val="50000"/>
+            </a:schemeClr>
+          </a:lnRef>
+          <a:fillRef idx="1">
+            <a:schemeClr val="accent1"/>
+          </a:fillRef>
+          <a:effectRef idx="0">
+            <a:schemeClr val="accent1"/>
+          </a:effectRef>
+          <a:fontRef idx="minor">
+            <a:schemeClr val="lt1"/>
+          </a:fontRef>
+        </p:style>
+        <p:txBody>
+          <a:bodyPr rtlCol="0" anchor="ctr"/>
+          <a:lstStyle/>
+          <a:p>
+            <a:pPr algn="ctr"/>
+            <a:r>
+              <a:rPr lang="en-US" dirty="0">
+                <a:solidFill>
+                  <a:schemeClr val="tx1"/>
+                </a:solidFill>
+              </a:rPr>
+              <a:t>Here are your drill bits, a drill with the power cord and fuse installed</a:t>
+            </a:r>
+            <a:endParaRPr lang="nl-BE" dirty="0">
+              <a:solidFill>
+                <a:schemeClr val="tx1"/>
+              </a:solidFill>
+            </a:endParaRPr>
+          </a:p>
+        </p:txBody>
+      </p:sp>
+      <p:sp>
+        <p:nvSpPr>
+          <p:cNvPr id="11" name="Rectangle: Rounded Corners 10">
+            <a:extLst>
+              <a:ext uri="{FF2B5EF4-FFF2-40B4-BE49-F238E27FC236}">
+                <a16:creationId xmlns:a16="http://schemas.microsoft.com/office/drawing/2014/main" id="{A4473A1F-62B5-437F-91D8-2C9BB825A5F1}"/>
+              </a:ext>
+            </a:extLst>
+          </p:cNvPr>
+          <p:cNvSpPr/>
+          <p:nvPr/>
+        </p:nvSpPr>
+        <p:spPr>
+          <a:xfrm>
+            <a:off x="3312219" y="3055742"/>
+            <a:ext cx="380311" cy="140129"/>
+          </a:xfrm>
+          <a:prstGeom prst="roundRect">
+            <a:avLst/>
+          </a:prstGeom>
+        </p:spPr>
+        <p:style>
+          <a:lnRef idx="2">
+            <a:schemeClr val="accent1">
+              <a:shade val="50000"/>
+            </a:schemeClr>
+          </a:lnRef>
+          <a:fillRef idx="1">
+            <a:schemeClr val="accent1"/>
+          </a:fillRef>
+          <a:effectRef idx="0">
+            <a:schemeClr val="accent1"/>
+          </a:effectRef>
+          <a:fontRef idx="minor">
+            <a:schemeClr val="lt1"/>
+          </a:fontRef>
+        </p:style>
+        <p:txBody>
+          <a:bodyPr rtlCol="0" anchor="ctr"/>
+          <a:lstStyle/>
+          <a:p>
+            <a:pPr algn="ctr"/>
+            <a:endParaRPr lang="nl-BE"/>
+          </a:p>
+        </p:txBody>
+      </p:sp>
+      <p:sp>
+        <p:nvSpPr>
+          <p:cNvPr id="6" name="Smiley Face 5">
+            <a:extLst>
+              <a:ext uri="{FF2B5EF4-FFF2-40B4-BE49-F238E27FC236}">
+                <a16:creationId xmlns:a16="http://schemas.microsoft.com/office/drawing/2014/main" id="{5F6B08CD-DDA5-412B-A08C-949305FB178B}"/>
+              </a:ext>
+            </a:extLst>
+          </p:cNvPr>
+          <p:cNvSpPr/>
+          <p:nvPr/>
+        </p:nvSpPr>
+        <p:spPr>
+          <a:xfrm>
+            <a:off x="3506600" y="2768366"/>
+            <a:ext cx="360726" cy="377505"/>
+          </a:xfrm>
+          <a:prstGeom prst="smileyFace">
+            <a:avLst>
+              <a:gd name="adj" fmla="val 4653"/>
+            </a:avLst>
+          </a:prstGeom>
+          <a:solidFill>
+            <a:schemeClr val="accent1">
+              <a:lumMod val="60000"/>
+              <a:lumOff val="40000"/>
+            </a:schemeClr>
+          </a:solidFill>
+          <a:ln>
+            <a:solidFill>
+              <a:schemeClr val="tx1"/>
+            </a:solidFill>
+          </a:ln>
+        </p:spPr>
+        <p:style>
+          <a:lnRef idx="2">
+            <a:schemeClr val="accent1">
+              <a:shade val="50000"/>
+            </a:schemeClr>
+          </a:lnRef>
+          <a:fillRef idx="1">
+            <a:schemeClr val="accent1"/>
+          </a:fillRef>
+          <a:effectRef idx="0">
+            <a:schemeClr val="accent1"/>
+          </a:effectRef>
+          <a:fontRef idx="minor">
+            <a:schemeClr val="lt1"/>
+          </a:fontRef>
+        </p:style>
+        <p:txBody>
+          <a:bodyPr rtlCol="0" anchor="ctr"/>
+          <a:lstStyle/>
+          <a:p>
+            <a:pPr algn="ctr"/>
+            <a:endParaRPr lang="nl-BE"/>
           </a:p>
         </p:txBody>
       </p:sp>
     </p:spTree>
     <p:extLst>
       <p:ext uri="{BB962C8B-B14F-4D97-AF65-F5344CB8AC3E}">
-        <p14:creationId xmlns:p14="http://schemas.microsoft.com/office/powerpoint/2010/main" val="3804878652"/>
+        <p14:creationId xmlns:p14="http://schemas.microsoft.com/office/powerpoint/2010/main" val="1875005659"/>
       </p:ext>
     </p:extLst>
   </p:cSld>
   <p:clrMapOvr>
     <a:masterClrMapping/>
   </p:clrMapOvr>
+  <p:timing>
+    <p:tnLst>
+      <p:par>
+        <p:cTn id="1" dur="indefinite" restart="never" nodeType="tmRoot">
+          <p:childTnLst>
+            <p:seq concurrent="1" nextAc="seek">
+              <p:cTn id="2" dur="indefinite" nodeType="mainSeq">
+                <p:childTnLst>
+                  <p:par>
+                    <p:cTn id="3" fill="hold">
+                      <p:stCondLst>
+                        <p:cond delay="indefinite"/>
+                      </p:stCondLst>
+                      <p:childTnLst>
+                        <p:par>
+                          <p:cTn id="4" fill="hold">
+                            <p:stCondLst>
+                              <p:cond delay="0"/>
+                            </p:stCondLst>
+                            <p:childTnLst>
+                              <p:par>
+                                <p:cTn id="5" presetID="1" presetClass="entr" presetSubtype="0" fill="hold" grpId="0" nodeType="clickEffect">
+                                  <p:stCondLst>
+                                    <p:cond delay="0"/>
+                                  </p:stCondLst>
+                                  <p:childTnLst>
+                                    <p:set>
+                                      <p:cBhvr>
+                                        <p:cTn id="6" dur="1" fill="hold">
+                                          <p:stCondLst>
+                                            <p:cond delay="0"/>
+                                          </p:stCondLst>
+                                        </p:cTn>
+                                        <p:tgtEl>
+                                          <p:spTgt spid="14"/>
+                                        </p:tgtEl>
+                                        <p:attrNameLst>
+                                          <p:attrName>style.visibility</p:attrName>
+                                        </p:attrNameLst>
+                                      </p:cBhvr>
+                                      <p:to>
+                                        <p:strVal val="visible"/>
+                                      </p:to>
+                                    </p:set>
+                                  </p:childTnLst>
+                                </p:cTn>
+                              </p:par>
+                            </p:childTnLst>
+                          </p:cTn>
+                        </p:par>
+                      </p:childTnLst>
+                    </p:cTn>
+                  </p:par>
+                  <p:par>
+                    <p:cTn id="7" fill="hold">
+                      <p:stCondLst>
+                        <p:cond delay="indefinite"/>
+                      </p:stCondLst>
+                      <p:childTnLst>
+                        <p:par>
+                          <p:cTn id="8" fill="hold">
+                            <p:stCondLst>
+                              <p:cond delay="0"/>
+                            </p:stCondLst>
+                            <p:childTnLst>
+                              <p:par>
+                                <p:cTn id="9" presetID="1" presetClass="exit" presetSubtype="0" fill="hold" grpId="1" nodeType="clickEffect">
+                                  <p:stCondLst>
+                                    <p:cond delay="0"/>
+                                  </p:stCondLst>
+                                  <p:childTnLst>
+                                    <p:set>
+                                      <p:cBhvr>
+                                        <p:cTn id="10" dur="1" fill="hold">
+                                          <p:stCondLst>
+                                            <p:cond delay="0"/>
+                                          </p:stCondLst>
+                                        </p:cTn>
+                                        <p:tgtEl>
+                                          <p:spTgt spid="14"/>
+                                        </p:tgtEl>
+                                        <p:attrNameLst>
+                                          <p:attrName>style.visibility</p:attrName>
+                                        </p:attrNameLst>
+                                      </p:cBhvr>
+                                      <p:to>
+                                        <p:strVal val="hidden"/>
+                                      </p:to>
+                                    </p:set>
+                                  </p:childTnLst>
+                                </p:cTn>
+                              </p:par>
+                              <p:par>
+                                <p:cTn id="11" presetID="1" presetClass="entr" presetSubtype="0" fill="hold" grpId="0" nodeType="withEffect">
+                                  <p:stCondLst>
+                                    <p:cond delay="0"/>
+                                  </p:stCondLst>
+                                  <p:childTnLst>
+                                    <p:set>
+                                      <p:cBhvr>
+                                        <p:cTn id="12" dur="1" fill="hold">
+                                          <p:stCondLst>
+                                            <p:cond delay="0"/>
+                                          </p:stCondLst>
+                                        </p:cTn>
+                                        <p:tgtEl>
+                                          <p:spTgt spid="7"/>
+                                        </p:tgtEl>
+                                        <p:attrNameLst>
+                                          <p:attrName>style.visibility</p:attrName>
+                                        </p:attrNameLst>
+                                      </p:cBhvr>
+                                      <p:to>
+                                        <p:strVal val="visible"/>
+                                      </p:to>
+                                    </p:set>
+                                  </p:childTnLst>
+                                </p:cTn>
+                              </p:par>
+                              <p:par>
+                                <p:cTn id="13" presetID="1" presetClass="entr" presetSubtype="0" fill="hold" grpId="0" nodeType="withEffect">
+                                  <p:stCondLst>
+                                    <p:cond delay="0"/>
+                                  </p:stCondLst>
+                                  <p:childTnLst>
+                                    <p:set>
+                                      <p:cBhvr>
+                                        <p:cTn id="14" dur="1" fill="hold">
+                                          <p:stCondLst>
+                                            <p:cond delay="0"/>
+                                          </p:stCondLst>
+                                        </p:cTn>
+                                        <p:tgtEl>
+                                          <p:spTgt spid="16"/>
+                                        </p:tgtEl>
+                                        <p:attrNameLst>
+                                          <p:attrName>style.visibility</p:attrName>
+                                        </p:attrNameLst>
+                                      </p:cBhvr>
+                                      <p:to>
+                                        <p:strVal val="visible"/>
+                                      </p:to>
+                                    </p:set>
+                                  </p:childTnLst>
+                                </p:cTn>
+                              </p:par>
+                            </p:childTnLst>
+                          </p:cTn>
+                        </p:par>
+                      </p:childTnLst>
+                    </p:cTn>
+                  </p:par>
+                  <p:par>
+                    <p:cTn id="15" fill="hold">
+                      <p:stCondLst>
+                        <p:cond delay="indefinite"/>
+                      </p:stCondLst>
+                      <p:childTnLst>
+                        <p:par>
+                          <p:cTn id="16" fill="hold">
+                            <p:stCondLst>
+                              <p:cond delay="0"/>
+                            </p:stCondLst>
+                            <p:childTnLst>
+                              <p:par>
+                                <p:cTn id="17" presetID="1" presetClass="exit" presetSubtype="0" fill="hold" grpId="1" nodeType="clickEffect">
+                                  <p:stCondLst>
+                                    <p:cond delay="0"/>
+                                  </p:stCondLst>
+                                  <p:childTnLst>
+                                    <p:set>
+                                      <p:cBhvr>
+                                        <p:cTn id="18" dur="1" fill="hold">
+                                          <p:stCondLst>
+                                            <p:cond delay="0"/>
+                                          </p:stCondLst>
+                                        </p:cTn>
+                                        <p:tgtEl>
+                                          <p:spTgt spid="16"/>
+                                        </p:tgtEl>
+                                        <p:attrNameLst>
+                                          <p:attrName>style.visibility</p:attrName>
+                                        </p:attrNameLst>
+                                      </p:cBhvr>
+                                      <p:to>
+                                        <p:strVal val="hidden"/>
+                                      </p:to>
+                                    </p:set>
+                                  </p:childTnLst>
+                                </p:cTn>
+                              </p:par>
+                              <p:par>
+                                <p:cTn id="19" presetID="1" presetClass="entr" presetSubtype="0" fill="hold" grpId="0" nodeType="withEffect">
+                                  <p:stCondLst>
+                                    <p:cond delay="0"/>
+                                  </p:stCondLst>
+                                  <p:childTnLst>
+                                    <p:set>
+                                      <p:cBhvr>
+                                        <p:cTn id="20" dur="1" fill="hold">
+                                          <p:stCondLst>
+                                            <p:cond delay="0"/>
+                                          </p:stCondLst>
+                                        </p:cTn>
+                                        <p:tgtEl>
+                                          <p:spTgt spid="19"/>
+                                        </p:tgtEl>
+                                        <p:attrNameLst>
+                                          <p:attrName>style.visibility</p:attrName>
+                                        </p:attrNameLst>
+                                      </p:cBhvr>
+                                      <p:to>
+                                        <p:strVal val="visible"/>
+                                      </p:to>
+                                    </p:set>
+                                  </p:childTnLst>
+                                </p:cTn>
+                              </p:par>
+                            </p:childTnLst>
+                          </p:cTn>
+                        </p:par>
+                      </p:childTnLst>
+                    </p:cTn>
+                  </p:par>
+                  <p:par>
+                    <p:cTn id="21" fill="hold">
+                      <p:stCondLst>
+                        <p:cond delay="indefinite"/>
+                      </p:stCondLst>
+                      <p:childTnLst>
+                        <p:par>
+                          <p:cTn id="22" fill="hold">
+                            <p:stCondLst>
+                              <p:cond delay="0"/>
+                            </p:stCondLst>
+                            <p:childTnLst>
+                              <p:par>
+                                <p:cTn id="23" presetID="1" presetClass="exit" presetSubtype="0" fill="hold" grpId="1" nodeType="clickEffect">
+                                  <p:stCondLst>
+                                    <p:cond delay="0"/>
+                                  </p:stCondLst>
+                                  <p:childTnLst>
+                                    <p:set>
+                                      <p:cBhvr>
+                                        <p:cTn id="24" dur="1" fill="hold">
+                                          <p:stCondLst>
+                                            <p:cond delay="0"/>
+                                          </p:stCondLst>
+                                        </p:cTn>
+                                        <p:tgtEl>
+                                          <p:spTgt spid="7"/>
+                                        </p:tgtEl>
+                                        <p:attrNameLst>
+                                          <p:attrName>style.visibility</p:attrName>
+                                        </p:attrNameLst>
+                                      </p:cBhvr>
+                                      <p:to>
+                                        <p:strVal val="hidden"/>
+                                      </p:to>
+                                    </p:set>
+                                  </p:childTnLst>
+                                </p:cTn>
+                              </p:par>
+                              <p:par>
+                                <p:cTn id="25" presetID="1" presetClass="exit" presetSubtype="0" fill="hold" grpId="1" nodeType="withEffect">
+                                  <p:stCondLst>
+                                    <p:cond delay="0"/>
+                                  </p:stCondLst>
+                                  <p:childTnLst>
+                                    <p:set>
+                                      <p:cBhvr>
+                                        <p:cTn id="26" dur="1" fill="hold">
+                                          <p:stCondLst>
+                                            <p:cond delay="0"/>
+                                          </p:stCondLst>
+                                        </p:cTn>
+                                        <p:tgtEl>
+                                          <p:spTgt spid="19"/>
+                                        </p:tgtEl>
+                                        <p:attrNameLst>
+                                          <p:attrName>style.visibility</p:attrName>
+                                        </p:attrNameLst>
+                                      </p:cBhvr>
+                                      <p:to>
+                                        <p:strVal val="hidden"/>
+                                      </p:to>
+                                    </p:set>
+                                  </p:childTnLst>
+                                </p:cTn>
+                              </p:par>
+                              <p:par>
+                                <p:cTn id="27" presetID="1" presetClass="entr" presetSubtype="0" fill="hold" grpId="0" nodeType="withEffect">
+                                  <p:stCondLst>
+                                    <p:cond delay="0"/>
+                                  </p:stCondLst>
+                                  <p:childTnLst>
+                                    <p:set>
+                                      <p:cBhvr>
+                                        <p:cTn id="28" dur="1" fill="hold">
+                                          <p:stCondLst>
+                                            <p:cond delay="0"/>
+                                          </p:stCondLst>
+                                        </p:cTn>
+                                        <p:tgtEl>
+                                          <p:spTgt spid="9"/>
+                                        </p:tgtEl>
+                                        <p:attrNameLst>
+                                          <p:attrName>style.visibility</p:attrName>
+                                        </p:attrNameLst>
+                                      </p:cBhvr>
+                                      <p:to>
+                                        <p:strVal val="visible"/>
+                                      </p:to>
+                                    </p:set>
+                                  </p:childTnLst>
+                                </p:cTn>
+                              </p:par>
+                            </p:childTnLst>
+                          </p:cTn>
+                        </p:par>
+                      </p:childTnLst>
+                    </p:cTn>
+                  </p:par>
+                  <p:par>
+                    <p:cTn id="29" fill="hold">
+                      <p:stCondLst>
+                        <p:cond delay="indefinite"/>
+                      </p:stCondLst>
+                      <p:childTnLst>
+                        <p:par>
+                          <p:cTn id="30" fill="hold">
+                            <p:stCondLst>
+                              <p:cond delay="0"/>
+                            </p:stCondLst>
+                            <p:childTnLst>
+                              <p:par>
+                                <p:cTn id="31" presetID="1" presetClass="entr" presetSubtype="0" fill="hold" grpId="0" nodeType="clickEffect">
+                                  <p:stCondLst>
+                                    <p:cond delay="0"/>
+                                  </p:stCondLst>
+                                  <p:childTnLst>
+                                    <p:set>
+                                      <p:cBhvr>
+                                        <p:cTn id="32" dur="1" fill="hold">
+                                          <p:stCondLst>
+                                            <p:cond delay="0"/>
+                                          </p:stCondLst>
+                                        </p:cTn>
+                                        <p:tgtEl>
+                                          <p:spTgt spid="15"/>
+                                        </p:tgtEl>
+                                        <p:attrNameLst>
+                                          <p:attrName>style.visibility</p:attrName>
+                                        </p:attrNameLst>
+                                      </p:cBhvr>
+                                      <p:to>
+                                        <p:strVal val="visible"/>
+                                      </p:to>
+                                    </p:set>
+                                  </p:childTnLst>
+                                </p:cTn>
+                              </p:par>
+                            </p:childTnLst>
+                          </p:cTn>
+                        </p:par>
+                      </p:childTnLst>
+                    </p:cTn>
+                  </p:par>
+                  <p:par>
+                    <p:cTn id="33" fill="hold">
+                      <p:stCondLst>
+                        <p:cond delay="indefinite"/>
+                      </p:stCondLst>
+                      <p:childTnLst>
+                        <p:par>
+                          <p:cTn id="34" fill="hold">
+                            <p:stCondLst>
+                              <p:cond delay="0"/>
+                            </p:stCondLst>
+                            <p:childTnLst>
+                              <p:par>
+                                <p:cTn id="35" presetID="1" presetClass="exit" presetSubtype="0" fill="hold" grpId="1" nodeType="clickEffect">
+                                  <p:stCondLst>
+                                    <p:cond delay="0"/>
+                                  </p:stCondLst>
+                                  <p:childTnLst>
+                                    <p:set>
+                                      <p:cBhvr>
+                                        <p:cTn id="36" dur="1" fill="hold">
+                                          <p:stCondLst>
+                                            <p:cond delay="0"/>
+                                          </p:stCondLst>
+                                        </p:cTn>
+                                        <p:tgtEl>
+                                          <p:spTgt spid="15"/>
+                                        </p:tgtEl>
+                                        <p:attrNameLst>
+                                          <p:attrName>style.visibility</p:attrName>
+                                        </p:attrNameLst>
+                                      </p:cBhvr>
+                                      <p:to>
+                                        <p:strVal val="hidden"/>
+                                      </p:to>
+                                    </p:set>
+                                  </p:childTnLst>
+                                </p:cTn>
+                              </p:par>
+                              <p:par>
+                                <p:cTn id="37" presetID="1" presetClass="entr" presetSubtype="0" fill="hold" grpId="0" nodeType="withEffect">
+                                  <p:stCondLst>
+                                    <p:cond delay="0"/>
+                                  </p:stCondLst>
+                                  <p:childTnLst>
+                                    <p:set>
+                                      <p:cBhvr>
+                                        <p:cTn id="38" dur="1" fill="hold">
+                                          <p:stCondLst>
+                                            <p:cond delay="0"/>
+                                          </p:stCondLst>
+                                        </p:cTn>
+                                        <p:tgtEl>
+                                          <p:spTgt spid="17"/>
+                                        </p:tgtEl>
+                                        <p:attrNameLst>
+                                          <p:attrName>style.visibility</p:attrName>
+                                        </p:attrNameLst>
+                                      </p:cBhvr>
+                                      <p:to>
+                                        <p:strVal val="visible"/>
+                                      </p:to>
+                                    </p:set>
+                                  </p:childTnLst>
+                                </p:cTn>
+                              </p:par>
+                              <p:par>
+                                <p:cTn id="39" presetID="1" presetClass="entr" presetSubtype="0" fill="hold" grpId="0" nodeType="withEffect">
+                                  <p:stCondLst>
+                                    <p:cond delay="0"/>
+                                  </p:stCondLst>
+                                  <p:childTnLst>
+                                    <p:set>
+                                      <p:cBhvr>
+                                        <p:cTn id="40" dur="1" fill="hold">
+                                          <p:stCondLst>
+                                            <p:cond delay="0"/>
+                                          </p:stCondLst>
+                                        </p:cTn>
+                                        <p:tgtEl>
+                                          <p:spTgt spid="8"/>
+                                        </p:tgtEl>
+                                        <p:attrNameLst>
+                                          <p:attrName>style.visibility</p:attrName>
+                                        </p:attrNameLst>
+                                      </p:cBhvr>
+                                      <p:to>
+                                        <p:strVal val="visible"/>
+                                      </p:to>
+                                    </p:set>
+                                  </p:childTnLst>
+                                </p:cTn>
+                              </p:par>
+                            </p:childTnLst>
+                          </p:cTn>
+                        </p:par>
+                      </p:childTnLst>
+                    </p:cTn>
+                  </p:par>
+                  <p:par>
+                    <p:cTn id="41" fill="hold">
+                      <p:stCondLst>
+                        <p:cond delay="indefinite"/>
+                      </p:stCondLst>
+                      <p:childTnLst>
+                        <p:par>
+                          <p:cTn id="42" fill="hold">
+                            <p:stCondLst>
+                              <p:cond delay="0"/>
+                            </p:stCondLst>
+                            <p:childTnLst>
+                              <p:par>
+                                <p:cTn id="43" presetID="1" presetClass="exit" presetSubtype="0" fill="hold" grpId="1" nodeType="clickEffect">
+                                  <p:stCondLst>
+                                    <p:cond delay="0"/>
+                                  </p:stCondLst>
+                                  <p:childTnLst>
+                                    <p:set>
+                                      <p:cBhvr>
+                                        <p:cTn id="44" dur="1" fill="hold">
+                                          <p:stCondLst>
+                                            <p:cond delay="0"/>
+                                          </p:stCondLst>
+                                        </p:cTn>
+                                        <p:tgtEl>
+                                          <p:spTgt spid="17"/>
+                                        </p:tgtEl>
+                                        <p:attrNameLst>
+                                          <p:attrName>style.visibility</p:attrName>
+                                        </p:attrNameLst>
+                                      </p:cBhvr>
+                                      <p:to>
+                                        <p:strVal val="hidden"/>
+                                      </p:to>
+                                    </p:set>
+                                  </p:childTnLst>
+                                </p:cTn>
+                              </p:par>
+                              <p:par>
+                                <p:cTn id="45" presetID="1" presetClass="entr" presetSubtype="0" fill="hold" grpId="2" nodeType="withEffect">
+                                  <p:stCondLst>
+                                    <p:cond delay="0"/>
+                                  </p:stCondLst>
+                                  <p:childTnLst>
+                                    <p:set>
+                                      <p:cBhvr>
+                                        <p:cTn id="46" dur="1" fill="hold">
+                                          <p:stCondLst>
+                                            <p:cond delay="0"/>
+                                          </p:stCondLst>
+                                        </p:cTn>
+                                        <p:tgtEl>
+                                          <p:spTgt spid="19"/>
+                                        </p:tgtEl>
+                                        <p:attrNameLst>
+                                          <p:attrName>style.visibility</p:attrName>
+                                        </p:attrNameLst>
+                                      </p:cBhvr>
+                                      <p:to>
+                                        <p:strVal val="visible"/>
+                                      </p:to>
+                                    </p:set>
+                                  </p:childTnLst>
+                                </p:cTn>
+                              </p:par>
+                            </p:childTnLst>
+                          </p:cTn>
+                        </p:par>
+                      </p:childTnLst>
+                    </p:cTn>
+                  </p:par>
+                  <p:par>
+                    <p:cTn id="47" fill="hold">
+                      <p:stCondLst>
+                        <p:cond delay="indefinite"/>
+                      </p:stCondLst>
+                      <p:childTnLst>
+                        <p:par>
+                          <p:cTn id="48" fill="hold">
+                            <p:stCondLst>
+                              <p:cond delay="0"/>
+                            </p:stCondLst>
+                            <p:childTnLst>
+                              <p:par>
+                                <p:cTn id="49" presetID="1" presetClass="exit" presetSubtype="0" fill="hold" grpId="3" nodeType="clickEffect">
+                                  <p:stCondLst>
+                                    <p:cond delay="0"/>
+                                  </p:stCondLst>
+                                  <p:childTnLst>
+                                    <p:set>
+                                      <p:cBhvr>
+                                        <p:cTn id="50" dur="1" fill="hold">
+                                          <p:stCondLst>
+                                            <p:cond delay="0"/>
+                                          </p:stCondLst>
+                                        </p:cTn>
+                                        <p:tgtEl>
+                                          <p:spTgt spid="19"/>
+                                        </p:tgtEl>
+                                        <p:attrNameLst>
+                                          <p:attrName>style.visibility</p:attrName>
+                                        </p:attrNameLst>
+                                      </p:cBhvr>
+                                      <p:to>
+                                        <p:strVal val="hidden"/>
+                                      </p:to>
+                                    </p:set>
+                                  </p:childTnLst>
+                                </p:cTn>
+                              </p:par>
+                              <p:par>
+                                <p:cTn id="51" presetID="1" presetClass="exit" presetSubtype="0" fill="hold" grpId="1" nodeType="withEffect">
+                                  <p:stCondLst>
+                                    <p:cond delay="0"/>
+                                  </p:stCondLst>
+                                  <p:childTnLst>
+                                    <p:set>
+                                      <p:cBhvr>
+                                        <p:cTn id="52" dur="1" fill="hold">
+                                          <p:stCondLst>
+                                            <p:cond delay="0"/>
+                                          </p:stCondLst>
+                                        </p:cTn>
+                                        <p:tgtEl>
+                                          <p:spTgt spid="8"/>
+                                        </p:tgtEl>
+                                        <p:attrNameLst>
+                                          <p:attrName>style.visibility</p:attrName>
+                                        </p:attrNameLst>
+                                      </p:cBhvr>
+                                      <p:to>
+                                        <p:strVal val="hidden"/>
+                                      </p:to>
+                                    </p:set>
+                                  </p:childTnLst>
+                                </p:cTn>
+                              </p:par>
+                              <p:par>
+                                <p:cTn id="53" presetID="1" presetClass="entr" presetSubtype="0" fill="hold" grpId="0" nodeType="withEffect">
+                                  <p:stCondLst>
+                                    <p:cond delay="0"/>
+                                  </p:stCondLst>
+                                  <p:childTnLst>
+                                    <p:set>
+                                      <p:cBhvr>
+                                        <p:cTn id="54" dur="1" fill="hold">
+                                          <p:stCondLst>
+                                            <p:cond delay="0"/>
+                                          </p:stCondLst>
+                                        </p:cTn>
+                                        <p:tgtEl>
+                                          <p:spTgt spid="18"/>
+                                        </p:tgtEl>
+                                        <p:attrNameLst>
+                                          <p:attrName>style.visibility</p:attrName>
+                                        </p:attrNameLst>
+                                      </p:cBhvr>
+                                      <p:to>
+                                        <p:strVal val="visible"/>
+                                      </p:to>
+                                    </p:set>
+                                  </p:childTnLst>
+                                </p:cTn>
+                              </p:par>
+                            </p:childTnLst>
+                          </p:cTn>
+                        </p:par>
+                      </p:childTnLst>
+                    </p:cTn>
+                  </p:par>
+                  <p:par>
+                    <p:cTn id="55" fill="hold">
+                      <p:stCondLst>
+                        <p:cond delay="indefinite"/>
+                      </p:stCondLst>
+                      <p:childTnLst>
+                        <p:par>
+                          <p:cTn id="56" fill="hold">
+                            <p:stCondLst>
+                              <p:cond delay="0"/>
+                            </p:stCondLst>
+                            <p:childTnLst>
+                              <p:par>
+                                <p:cTn id="57" presetID="10" presetClass="exit" presetSubtype="0" fill="hold" grpId="0" nodeType="clickEffect">
+                                  <p:stCondLst>
+                                    <p:cond delay="0"/>
+                                  </p:stCondLst>
+                                  <p:childTnLst>
+                                    <p:animEffect transition="out" filter="fade">
+                                      <p:cBhvr>
+                                        <p:cTn id="58" dur="500"/>
+                                        <p:tgtEl>
+                                          <p:spTgt spid="5"/>
+                                        </p:tgtEl>
+                                      </p:cBhvr>
+                                    </p:animEffect>
+                                    <p:set>
+                                      <p:cBhvr>
+                                        <p:cTn id="59" dur="1" fill="hold">
+                                          <p:stCondLst>
+                                            <p:cond delay="499"/>
+                                          </p:stCondLst>
+                                        </p:cTn>
+                                        <p:tgtEl>
+                                          <p:spTgt spid="5"/>
+                                        </p:tgtEl>
+                                        <p:attrNameLst>
+                                          <p:attrName>style.visibility</p:attrName>
+                                        </p:attrNameLst>
+                                      </p:cBhvr>
+                                      <p:to>
+                                        <p:strVal val="hidden"/>
+                                      </p:to>
+                                    </p:set>
+                                  </p:childTnLst>
+                                </p:cTn>
+                              </p:par>
+                              <p:par>
+                                <p:cTn id="60" presetID="10" presetClass="entr" presetSubtype="0" fill="hold" grpId="0" nodeType="withEffect">
+                                  <p:stCondLst>
+                                    <p:cond delay="0"/>
+                                  </p:stCondLst>
+                                  <p:childTnLst>
+                                    <p:set>
+                                      <p:cBhvr>
+                                        <p:cTn id="61" dur="1" fill="hold">
+                                          <p:stCondLst>
+                                            <p:cond delay="0"/>
+                                          </p:stCondLst>
+                                        </p:cTn>
+                                        <p:tgtEl>
+                                          <p:spTgt spid="21"/>
+                                        </p:tgtEl>
+                                        <p:attrNameLst>
+                                          <p:attrName>style.visibility</p:attrName>
+                                        </p:attrNameLst>
+                                      </p:cBhvr>
+                                      <p:to>
+                                        <p:strVal val="visible"/>
+                                      </p:to>
+                                    </p:set>
+                                    <p:animEffect transition="in" filter="fade">
+                                      <p:cBhvr>
+                                        <p:cTn id="62" dur="500"/>
+                                        <p:tgtEl>
+                                          <p:spTgt spid="21"/>
+                                        </p:tgtEl>
+                                      </p:cBhvr>
+                                    </p:animEffect>
+                                  </p:childTnLst>
+                                </p:cTn>
+                              </p:par>
+                            </p:childTnLst>
+                          </p:cTn>
+                        </p:par>
+                      </p:childTnLst>
+                    </p:cTn>
+                  </p:par>
+                </p:childTnLst>
+              </p:cTn>
+              <p:prevCondLst>
+                <p:cond evt="onPrev" delay="0">
+                  <p:tgtEl>
+                    <p:sldTgt/>
+                  </p:tgtEl>
+                </p:cond>
+              </p:prevCondLst>
+              <p:nextCondLst>
+                <p:cond evt="onNext" delay="0">
+                  <p:tgtEl>
+                    <p:sldTgt/>
+                  </p:tgtEl>
+                </p:cond>
+              </p:nextCondLst>
+            </p:seq>
+          </p:childTnLst>
+        </p:cTn>
+      </p:par>
+    </p:tnLst>
+    <p:bldLst>
+      <p:bldP spid="5" grpId="0" animBg="1"/>
+      <p:bldP spid="7" grpId="0" animBg="1"/>
+      <p:bldP spid="7" grpId="1" animBg="1"/>
+      <p:bldP spid="8" grpId="0" animBg="1"/>
+      <p:bldP spid="8" grpId="1" animBg="1"/>
+      <p:bldP spid="9" grpId="0" animBg="1"/>
+      <p:bldP spid="14" grpId="0" animBg="1"/>
+      <p:bldP spid="14" grpId="1" animBg="1"/>
+      <p:bldP spid="15" grpId="0" animBg="1"/>
+      <p:bldP spid="15" grpId="1" animBg="1"/>
+      <p:bldP spid="16" grpId="0" animBg="1"/>
+      <p:bldP spid="16" grpId="1" animBg="1"/>
+      <p:bldP spid="17" grpId="0" animBg="1"/>
+      <p:bldP spid="17" grpId="1" animBg="1"/>
+      <p:bldP spid="18" grpId="0" animBg="1"/>
+      <p:bldP spid="21" grpId="0" animBg="1"/>
+      <p:bldP spid="19" grpId="0" animBg="1"/>
+      <p:bldP spid="19" grpId="1" animBg="1"/>
+      <p:bldP spid="19" grpId="2" animBg="1"/>
+      <p:bldP spid="19" grpId="3" animBg="1"/>
+    </p:bldLst>
+  </p:timing>
 </p:sld>
 </file>
 
@@ -3804,7 +6728,7 @@
           <p:cNvPr id="2" name="Title 1">
             <a:extLst>
               <a:ext uri="{FF2B5EF4-FFF2-40B4-BE49-F238E27FC236}">
-                <a16:creationId xmlns:a16="http://schemas.microsoft.com/office/drawing/2014/main" id="{A1794EBB-F0E7-4F82-B3D5-95C4654C00DC}"/>
+                <a16:creationId xmlns:a16="http://schemas.microsoft.com/office/drawing/2014/main" id="{D9EC165F-ACC2-4E74-AD68-984B43F5522C}"/>
               </a:ext>
             </a:extLst>
           </p:cNvPr>
@@ -3815,7 +6739,12 @@
             <p:ph type="title"/>
           </p:nvPr>
         </p:nvSpPr>
-        <p:spPr/>
+        <p:spPr>
+          <a:xfrm>
+            <a:off x="2610195" y="512749"/>
+            <a:ext cx="9134392" cy="636559"/>
+          </a:xfrm>
+        </p:spPr>
         <p:txBody>
           <a:bodyPr>
             <a:normAutofit fontScale="90000"/>
@@ -3824,7 +6753,7 @@
           <a:p>
             <a:r>
               <a:rPr lang="en-US" dirty="0"/>
-              <a:t>DI in Umbraco 8</a:t>
+              <a:t>DI and Inversion Of Control containers (IOC)</a:t>
             </a:r>
             <a:endParaRPr lang="nl-BE" dirty="0"/>
           </a:p>
@@ -3835,7 +6764,7 @@
           <p:cNvPr id="3" name="Content Placeholder 2">
             <a:extLst>
               <a:ext uri="{FF2B5EF4-FFF2-40B4-BE49-F238E27FC236}">
-                <a16:creationId xmlns:a16="http://schemas.microsoft.com/office/drawing/2014/main" id="{20B8399C-30A7-4950-B55B-11E45F8A0621}"/>
+                <a16:creationId xmlns:a16="http://schemas.microsoft.com/office/drawing/2014/main" id="{AB274DF0-3CA1-45BD-B8AF-C79B08964714}"/>
               </a:ext>
             </a:extLst>
           </p:cNvPr>
@@ -3853,27 +6782,28 @@
           <a:p>
             <a:r>
               <a:rPr lang="en-US" dirty="0"/>
-              <a:t>Register implementations into Umbraco</a:t>
+              <a:t>Optional tool</a:t>
             </a:r>
           </a:p>
           <a:p>
             <a:r>
               <a:rPr lang="en-US" dirty="0"/>
-              <a:t>Requesting dependencies in Umbraco</a:t>
-            </a:r>
-          </a:p>
-          <a:p>
-            <a:r>
-              <a:rPr lang="nl-BE" dirty="0"/>
-              <a:t>A demo!</a:t>
-            </a:r>
+              <a:t>Central place to manage the creation of your dependencies</a:t>
+            </a:r>
+          </a:p>
+          <a:p>
+            <a:r>
+              <a:rPr lang="en-US" dirty="0"/>
+              <a:t>Umbraco 8 and mvc.net core have it baked in</a:t>
+            </a:r>
+            <a:endParaRPr lang="nl-BE" dirty="0"/>
           </a:p>
         </p:txBody>
       </p:sp>
     </p:spTree>
     <p:extLst>
       <p:ext uri="{BB962C8B-B14F-4D97-AF65-F5344CB8AC3E}">
-        <p14:creationId xmlns:p14="http://schemas.microsoft.com/office/powerpoint/2010/main" val="3460799248"/>
+        <p14:creationId xmlns:p14="http://schemas.microsoft.com/office/powerpoint/2010/main" val="3804878652"/>
       </p:ext>
     </p:extLst>
   </p:cSld>
@@ -3905,6 +6835,107 @@
           <p:cNvPr id="2" name="Title 1">
             <a:extLst>
               <a:ext uri="{FF2B5EF4-FFF2-40B4-BE49-F238E27FC236}">
+                <a16:creationId xmlns:a16="http://schemas.microsoft.com/office/drawing/2014/main" id="{A1794EBB-F0E7-4F82-B3D5-95C4654C00DC}"/>
+              </a:ext>
+            </a:extLst>
+          </p:cNvPr>
+          <p:cNvSpPr>
+            <a:spLocks noGrp="1"/>
+          </p:cNvSpPr>
+          <p:nvPr>
+            <p:ph type="title"/>
+          </p:nvPr>
+        </p:nvSpPr>
+        <p:spPr/>
+        <p:txBody>
+          <a:bodyPr>
+            <a:normAutofit fontScale="90000"/>
+          </a:bodyPr>
+          <a:lstStyle/>
+          <a:p>
+            <a:r>
+              <a:rPr lang="en-US" dirty="0"/>
+              <a:t>DI in Umbraco 8</a:t>
+            </a:r>
+            <a:endParaRPr lang="nl-BE" dirty="0"/>
+          </a:p>
+        </p:txBody>
+      </p:sp>
+      <p:sp>
+        <p:nvSpPr>
+          <p:cNvPr id="3" name="Content Placeholder 2">
+            <a:extLst>
+              <a:ext uri="{FF2B5EF4-FFF2-40B4-BE49-F238E27FC236}">
+                <a16:creationId xmlns:a16="http://schemas.microsoft.com/office/drawing/2014/main" id="{20B8399C-30A7-4950-B55B-11E45F8A0621}"/>
+              </a:ext>
+            </a:extLst>
+          </p:cNvPr>
+          <p:cNvSpPr>
+            <a:spLocks noGrp="1"/>
+          </p:cNvSpPr>
+          <p:nvPr>
+            <p:ph idx="1"/>
+          </p:nvPr>
+        </p:nvSpPr>
+        <p:spPr/>
+        <p:txBody>
+          <a:bodyPr/>
+          <a:lstStyle/>
+          <a:p>
+            <a:r>
+              <a:rPr lang="en-US" dirty="0"/>
+              <a:t>Register implementations into Umbraco</a:t>
+            </a:r>
+          </a:p>
+          <a:p>
+            <a:r>
+              <a:rPr lang="en-US" dirty="0"/>
+              <a:t>Requesting dependencies in Umbraco</a:t>
+            </a:r>
+          </a:p>
+          <a:p>
+            <a:r>
+              <a:rPr lang="nl-BE" dirty="0"/>
+              <a:t>A demo!</a:t>
+            </a:r>
+          </a:p>
+        </p:txBody>
+      </p:sp>
+    </p:spTree>
+    <p:extLst>
+      <p:ext uri="{BB962C8B-B14F-4D97-AF65-F5344CB8AC3E}">
+        <p14:creationId xmlns:p14="http://schemas.microsoft.com/office/powerpoint/2010/main" val="3460799248"/>
+      </p:ext>
+    </p:extLst>
+  </p:cSld>
+  <p:clrMapOvr>
+    <a:masterClrMapping/>
+  </p:clrMapOvr>
+</p:sld>
+</file>
+
+<file path=ppt/slides/slide7.xml><?xml version="1.0" encoding="utf-8"?>
+<p:sld xmlns:a="http://schemas.openxmlformats.org/drawingml/2006/main" xmlns:r="http://schemas.openxmlformats.org/officeDocument/2006/relationships" xmlns:p="http://schemas.openxmlformats.org/presentationml/2006/main">
+  <p:cSld>
+    <p:spTree>
+      <p:nvGrpSpPr>
+        <p:cNvPr id="1" name=""/>
+        <p:cNvGrpSpPr/>
+        <p:nvPr/>
+      </p:nvGrpSpPr>
+      <p:grpSpPr>
+        <a:xfrm>
+          <a:off x="0" y="0"/>
+          <a:ext cx="0" cy="0"/>
+          <a:chOff x="0" y="0"/>
+          <a:chExt cx="0" cy="0"/>
+        </a:xfrm>
+      </p:grpSpPr>
+      <p:sp>
+        <p:nvSpPr>
+          <p:cNvPr id="2" name="Title 1">
+            <a:extLst>
+              <a:ext uri="{FF2B5EF4-FFF2-40B4-BE49-F238E27FC236}">
                 <a16:creationId xmlns:a16="http://schemas.microsoft.com/office/drawing/2014/main" id="{4EE80496-1F3C-4AA7-ABB5-106A7D407F8F}"/>
               </a:ext>
             </a:extLst>
@@ -4075,7 +7106,7 @@
 </p:sld>
 </file>
 
-<file path=ppt/slides/slide7.xml><?xml version="1.0" encoding="utf-8"?>
+<file path=ppt/slides/slide8.xml><?xml version="1.0" encoding="utf-8"?>
 <p:sld xmlns:a="http://schemas.openxmlformats.org/drawingml/2006/main" xmlns:r="http://schemas.openxmlformats.org/officeDocument/2006/relationships" xmlns:p="http://schemas.openxmlformats.org/presentationml/2006/main">
   <p:cSld>
     <p:spTree>

</xml_diff>